<commit_message>
Se realiza analisis por arboles de desiciones
</commit_message>
<xml_diff>
--- a/presentación/presentacionMineriaDeDatos.pptx
+++ b/presentación/presentacionMineriaDeDatos.pptx
@@ -5,7 +5,7 @@
     <p:sldMasterId id="2147483660" r:id="rId1"/>
   </p:sldMasterIdLst>
   <p:notesMasterIdLst>
-    <p:notesMasterId r:id="rId24"/>
+    <p:notesMasterId r:id="rId23"/>
   </p:notesMasterIdLst>
   <p:sldIdLst>
     <p:sldId id="262" r:id="rId2"/>
@@ -26,10 +26,9 @@
     <p:sldId id="318" r:id="rId17"/>
     <p:sldId id="319" r:id="rId18"/>
     <p:sldId id="320" r:id="rId19"/>
-    <p:sldId id="323" r:id="rId20"/>
-    <p:sldId id="325" r:id="rId21"/>
-    <p:sldId id="326" r:id="rId22"/>
-    <p:sldId id="324" r:id="rId23"/>
+    <p:sldId id="325" r:id="rId20"/>
+    <p:sldId id="326" r:id="rId21"/>
+    <p:sldId id="324" r:id="rId22"/>
   </p:sldIdLst>
   <p:sldSz cx="9144000" cy="6858000" type="letter"/>
   <p:notesSz cx="6858000" cy="9144000"/>
@@ -139,11 +138,7 @@
 <file path=ppt/revisionInfo.xml><?xml version="1.0" encoding="utf-8"?>
 <p1510:revInfo xmlns:a="http://schemas.openxmlformats.org/drawingml/2006/main" xmlns:r="http://schemas.openxmlformats.org/officeDocument/2006/relationships" xmlns:p1510="http://schemas.microsoft.com/office/powerpoint/2015/10/main">
   <p1510:revLst>
-    <p1510:client id="{3A7F9412-3488-4BA4-8AB4-0FB30BEA8B99}" v="328" dt="2024-04-20T13:19:35.378"/>
-    <p1510:client id="{5B4D70C6-83A3-41C3-8256-4EC1A969E359}" v="1600" dt="2024-04-20T14:48:09.722"/>
-    <p1510:client id="{69272609-9CD6-E199-76B3-AC35A60DA004}" v="21" dt="2024-04-20T13:43:24.892"/>
-    <p1510:client id="{7445F970-8BA9-EE1E-3E0A-E0D8FB319514}" v="5" vWet="6" dt="2024-04-20T01:56:14.310"/>
-    <p1510:client id="{987AD8C0-1D3C-D0A0-4B20-11FF2112F1DE}" v="1877" dt="2024-04-20T14:08:06.419"/>
+    <p1510:client id="{C1D83132-9614-F8F2-79FB-6DF641706D93}" v="6" dt="2024-05-26T21:04:56.468"/>
   </p1510:revLst>
 </p1510:revInfo>
 </file>
@@ -230,491 +225,6 @@
     </pc:docChg>
   </pc:docChgLst>
   <pc:docChgLst>
-    <pc:chgData name="PEREZ VERGARA MELANY" userId="S::m.perezvergara@uandresbello.edu::d95698a7-632e-4c03-ab0f-564477513d69" providerId="AD" clId="Web-{512BB393-AFC8-321A-CA6F-0FE68B77EE34}"/>
-    <pc:docChg chg="addSld modSld">
-      <pc:chgData name="PEREZ VERGARA MELANY" userId="S::m.perezvergara@uandresbello.edu::d95698a7-632e-4c03-ab0f-564477513d69" providerId="AD" clId="Web-{512BB393-AFC8-321A-CA6F-0FE68B77EE34}" dt="2024-04-19T01:55:38.091" v="766" actId="20577"/>
-      <pc:docMkLst>
-        <pc:docMk/>
-      </pc:docMkLst>
-      <pc:sldChg chg="modSp">
-        <pc:chgData name="PEREZ VERGARA MELANY" userId="S::m.perezvergara@uandresbello.edu::d95698a7-632e-4c03-ab0f-564477513d69" providerId="AD" clId="Web-{512BB393-AFC8-321A-CA6F-0FE68B77EE34}" dt="2024-04-19T01:55:38.091" v="766" actId="20577"/>
-        <pc:sldMkLst>
-          <pc:docMk/>
-          <pc:sldMk cId="4002806811" sldId="305"/>
-        </pc:sldMkLst>
-        <pc:spChg chg="mod">
-          <ac:chgData name="PEREZ VERGARA MELANY" userId="S::m.perezvergara@uandresbello.edu::d95698a7-632e-4c03-ab0f-564477513d69" providerId="AD" clId="Web-{512BB393-AFC8-321A-CA6F-0FE68B77EE34}" dt="2024-04-19T01:55:38.091" v="766" actId="20577"/>
-          <ac:spMkLst>
-            <pc:docMk/>
-            <pc:sldMk cId="4002806811" sldId="305"/>
-            <ac:spMk id="46" creationId="{407ACAF3-9F46-4590-BB27-0A76A5E37EF0}"/>
-          </ac:spMkLst>
-        </pc:spChg>
-        <pc:spChg chg="mod">
-          <ac:chgData name="PEREZ VERGARA MELANY" userId="S::m.perezvergara@uandresbello.edu::d95698a7-632e-4c03-ab0f-564477513d69" providerId="AD" clId="Web-{512BB393-AFC8-321A-CA6F-0FE68B77EE34}" dt="2024-04-19T01:54:55.167" v="758" actId="20577"/>
-          <ac:spMkLst>
-            <pc:docMk/>
-            <pc:sldMk cId="4002806811" sldId="305"/>
-            <ac:spMk id="78" creationId="{01A187E2-50D2-4CF9-BEC4-99ED7D9D1517}"/>
-          </ac:spMkLst>
-        </pc:spChg>
-      </pc:sldChg>
-      <pc:sldChg chg="addSp delSp modSp">
-        <pc:chgData name="PEREZ VERGARA MELANY" userId="S::m.perezvergara@uandresbello.edu::d95698a7-632e-4c03-ab0f-564477513d69" providerId="AD" clId="Web-{512BB393-AFC8-321A-CA6F-0FE68B77EE34}" dt="2024-04-19T01:07:30.976" v="279" actId="1076"/>
-        <pc:sldMkLst>
-          <pc:docMk/>
-          <pc:sldMk cId="1677787951" sldId="307"/>
-        </pc:sldMkLst>
-        <pc:spChg chg="del">
-          <ac:chgData name="PEREZ VERGARA MELANY" userId="S::m.perezvergara@uandresbello.edu::d95698a7-632e-4c03-ab0f-564477513d69" providerId="AD" clId="Web-{512BB393-AFC8-321A-CA6F-0FE68B77EE34}" dt="2024-04-19T00:42:44.457" v="26"/>
-          <ac:spMkLst>
-            <pc:docMk/>
-            <pc:sldMk cId="1677787951" sldId="307"/>
-            <ac:spMk id="2" creationId="{89F7B28D-E55B-A156-E75F-6B7FAAC53BF2}"/>
-          </ac:spMkLst>
-        </pc:spChg>
-        <pc:spChg chg="del">
-          <ac:chgData name="PEREZ VERGARA MELANY" userId="S::m.perezvergara@uandresbello.edu::d95698a7-632e-4c03-ab0f-564477513d69" providerId="AD" clId="Web-{512BB393-AFC8-321A-CA6F-0FE68B77EE34}" dt="2024-04-19T00:42:41.363" v="25"/>
-          <ac:spMkLst>
-            <pc:docMk/>
-            <pc:sldMk cId="1677787951" sldId="307"/>
-            <ac:spMk id="3" creationId="{D475482D-7F09-DE4F-FF9A-2C7FBEF94594}"/>
-          </ac:spMkLst>
-        </pc:spChg>
-        <pc:spChg chg="add mod">
-          <ac:chgData name="PEREZ VERGARA MELANY" userId="S::m.perezvergara@uandresbello.edu::d95698a7-632e-4c03-ab0f-564477513d69" providerId="AD" clId="Web-{512BB393-AFC8-321A-CA6F-0FE68B77EE34}" dt="2024-04-19T01:01:44.676" v="244" actId="1076"/>
-          <ac:spMkLst>
-            <pc:docMk/>
-            <pc:sldMk cId="1677787951" sldId="307"/>
-            <ac:spMk id="4" creationId="{D4E280EB-7A2F-4C18-150A-38B298C950B4}"/>
-          </ac:spMkLst>
-        </pc:spChg>
-        <pc:spChg chg="mod">
-          <ac:chgData name="PEREZ VERGARA MELANY" userId="S::m.perezvergara@uandresbello.edu::d95698a7-632e-4c03-ab0f-564477513d69" providerId="AD" clId="Web-{512BB393-AFC8-321A-CA6F-0FE68B77EE34}" dt="2024-04-19T01:01:38.676" v="243"/>
-          <ac:spMkLst>
-            <pc:docMk/>
-            <pc:sldMk cId="1677787951" sldId="307"/>
-            <ac:spMk id="5" creationId="{699E2788-EBE2-45DF-9C0B-D666080A46A9}"/>
-          </ac:spMkLst>
-        </pc:spChg>
-        <pc:spChg chg="del mod">
-          <ac:chgData name="PEREZ VERGARA MELANY" userId="S::m.perezvergara@uandresbello.edu::d95698a7-632e-4c03-ab0f-564477513d69" providerId="AD" clId="Web-{512BB393-AFC8-321A-CA6F-0FE68B77EE34}" dt="2024-04-19T00:42:36.879" v="24"/>
-          <ac:spMkLst>
-            <pc:docMk/>
-            <pc:sldMk cId="1677787951" sldId="307"/>
-            <ac:spMk id="6" creationId="{9DEC9D77-6AA7-4B6B-881C-F31DAAE1DB2A}"/>
-          </ac:spMkLst>
-        </pc:spChg>
-        <pc:spChg chg="add mod">
-          <ac:chgData name="PEREZ VERGARA MELANY" userId="S::m.perezvergara@uandresbello.edu::d95698a7-632e-4c03-ab0f-564477513d69" providerId="AD" clId="Web-{512BB393-AFC8-321A-CA6F-0FE68B77EE34}" dt="2024-04-19T01:03:49.292" v="264" actId="1076"/>
-          <ac:spMkLst>
-            <pc:docMk/>
-            <pc:sldMk cId="1677787951" sldId="307"/>
-            <ac:spMk id="7" creationId="{96739617-0171-F356-FA57-24597D06AC62}"/>
-          </ac:spMkLst>
-        </pc:spChg>
-        <pc:spChg chg="del">
-          <ac:chgData name="PEREZ VERGARA MELANY" userId="S::m.perezvergara@uandresbello.edu::d95698a7-632e-4c03-ab0f-564477513d69" providerId="AD" clId="Web-{512BB393-AFC8-321A-CA6F-0FE68B77EE34}" dt="2024-04-19T00:45:59.907" v="31"/>
-          <ac:spMkLst>
-            <pc:docMk/>
-            <pc:sldMk cId="1677787951" sldId="307"/>
-            <ac:spMk id="8" creationId="{8E5AB793-981F-4F0C-993F-B574912D895B}"/>
-          </ac:spMkLst>
-        </pc:spChg>
-        <pc:spChg chg="mod">
-          <ac:chgData name="PEREZ VERGARA MELANY" userId="S::m.perezvergara@uandresbello.edu::d95698a7-632e-4c03-ab0f-564477513d69" providerId="AD" clId="Web-{512BB393-AFC8-321A-CA6F-0FE68B77EE34}" dt="2024-04-19T01:07:30.976" v="279" actId="1076"/>
-          <ac:spMkLst>
-            <pc:docMk/>
-            <pc:sldMk cId="1677787951" sldId="307"/>
-            <ac:spMk id="10" creationId="{DC1D303F-E600-4ACE-9AB7-C6AEB05050D4}"/>
-          </ac:spMkLst>
-        </pc:spChg>
-        <pc:spChg chg="add mod">
-          <ac:chgData name="PEREZ VERGARA MELANY" userId="S::m.perezvergara@uandresbello.edu::d95698a7-632e-4c03-ab0f-564477513d69" providerId="AD" clId="Web-{512BB393-AFC8-321A-CA6F-0FE68B77EE34}" dt="2024-04-19T01:04:02.481" v="265" actId="1076"/>
-          <ac:spMkLst>
-            <pc:docMk/>
-            <pc:sldMk cId="1677787951" sldId="307"/>
-            <ac:spMk id="11" creationId="{121DDE4A-F080-BD75-0314-DE2CD23B7C0D}"/>
-          </ac:spMkLst>
-        </pc:spChg>
-        <pc:spChg chg="del mod">
-          <ac:chgData name="PEREZ VERGARA MELANY" userId="S::m.perezvergara@uandresbello.edu::d95698a7-632e-4c03-ab0f-564477513d69" providerId="AD" clId="Web-{512BB393-AFC8-321A-CA6F-0FE68B77EE34}" dt="2024-04-19T00:21:15.398" v="9"/>
-          <ac:spMkLst>
-            <pc:docMk/>
-            <pc:sldMk cId="1677787951" sldId="307"/>
-            <ac:spMk id="11" creationId="{ACB6F962-DADC-4482-8A69-766A19968AF5}"/>
-          </ac:spMkLst>
-        </pc:spChg>
-        <pc:spChg chg="del">
-          <ac:chgData name="PEREZ VERGARA MELANY" userId="S::m.perezvergara@uandresbello.edu::d95698a7-632e-4c03-ab0f-564477513d69" providerId="AD" clId="Web-{512BB393-AFC8-321A-CA6F-0FE68B77EE34}" dt="2024-04-19T00:22:39.620" v="12"/>
-          <ac:spMkLst>
-            <pc:docMk/>
-            <pc:sldMk cId="1677787951" sldId="307"/>
-            <ac:spMk id="12" creationId="{A3A365B2-B2DE-4D2C-92CE-32C0611969DB}"/>
-          </ac:spMkLst>
-        </pc:spChg>
-        <pc:spChg chg="add mod">
-          <ac:chgData name="PEREZ VERGARA MELANY" userId="S::m.perezvergara@uandresbello.edu::d95698a7-632e-4c03-ab0f-564477513d69" providerId="AD" clId="Web-{512BB393-AFC8-321A-CA6F-0FE68B77EE34}" dt="2024-04-19T01:07:04.272" v="274" actId="20577"/>
-          <ac:spMkLst>
-            <pc:docMk/>
-            <pc:sldMk cId="1677787951" sldId="307"/>
-            <ac:spMk id="12" creationId="{FCD74C54-A2BA-C62A-8C3D-6FBB66913252}"/>
-          </ac:spMkLst>
-        </pc:spChg>
-        <pc:spChg chg="add mod">
-          <ac:chgData name="PEREZ VERGARA MELANY" userId="S::m.perezvergara@uandresbello.edu::d95698a7-632e-4c03-ab0f-564477513d69" providerId="AD" clId="Web-{512BB393-AFC8-321A-CA6F-0FE68B77EE34}" dt="2024-04-19T01:07:16.819" v="277" actId="1076"/>
-          <ac:spMkLst>
-            <pc:docMk/>
-            <pc:sldMk cId="1677787951" sldId="307"/>
-            <ac:spMk id="17" creationId="{3E9CB07A-4474-8A61-287D-570011831083}"/>
-          </ac:spMkLst>
-        </pc:spChg>
-        <pc:spChg chg="del">
-          <ac:chgData name="PEREZ VERGARA MELANY" userId="S::m.perezvergara@uandresbello.edu::d95698a7-632e-4c03-ab0f-564477513d69" providerId="AD" clId="Web-{512BB393-AFC8-321A-CA6F-0FE68B77EE34}" dt="2024-04-19T00:45:50.141" v="29"/>
-          <ac:spMkLst>
-            <pc:docMk/>
-            <pc:sldMk cId="1677787951" sldId="307"/>
-            <ac:spMk id="19" creationId="{9052CB31-5E86-43F7-9E18-68D97336D3DC}"/>
-          </ac:spMkLst>
-        </pc:spChg>
-        <pc:spChg chg="del">
-          <ac:chgData name="PEREZ VERGARA MELANY" userId="S::m.perezvergara@uandresbello.edu::d95698a7-632e-4c03-ab0f-564477513d69" providerId="AD" clId="Web-{512BB393-AFC8-321A-CA6F-0FE68B77EE34}" dt="2024-04-19T00:46:07.204" v="35"/>
-          <ac:spMkLst>
-            <pc:docMk/>
-            <pc:sldMk cId="1677787951" sldId="307"/>
-            <ac:spMk id="20" creationId="{BF49D49A-95BF-4D21-AE29-BD9D704FEC5F}"/>
-          </ac:spMkLst>
-        </pc:spChg>
-        <pc:spChg chg="del">
-          <ac:chgData name="PEREZ VERGARA MELANY" userId="S::m.perezvergara@uandresbello.edu::d95698a7-632e-4c03-ab0f-564477513d69" providerId="AD" clId="Web-{512BB393-AFC8-321A-CA6F-0FE68B77EE34}" dt="2024-04-19T00:46:03.016" v="32"/>
-          <ac:spMkLst>
-            <pc:docMk/>
-            <pc:sldMk cId="1677787951" sldId="307"/>
-            <ac:spMk id="21" creationId="{6A548F58-8CF8-4D0C-8871-44C1700A4D4B}"/>
-          </ac:spMkLst>
-        </pc:spChg>
-        <pc:spChg chg="mod ord">
-          <ac:chgData name="PEREZ VERGARA MELANY" userId="S::m.perezvergara@uandresbello.edu::d95698a7-632e-4c03-ab0f-564477513d69" providerId="AD" clId="Web-{512BB393-AFC8-321A-CA6F-0FE68B77EE34}" dt="2024-04-19T01:03:43.558" v="263"/>
-          <ac:spMkLst>
-            <pc:docMk/>
-            <pc:sldMk cId="1677787951" sldId="307"/>
-            <ac:spMk id="23" creationId="{73182A38-D6DF-453D-921E-315EFA20E2ED}"/>
-          </ac:spMkLst>
-        </pc:spChg>
-        <pc:spChg chg="add del mod ord">
-          <ac:chgData name="PEREZ VERGARA MELANY" userId="S::m.perezvergara@uandresbello.edu::d95698a7-632e-4c03-ab0f-564477513d69" providerId="AD" clId="Web-{512BB393-AFC8-321A-CA6F-0FE68B77EE34}" dt="2024-04-19T01:03:14.384" v="256"/>
-          <ac:spMkLst>
-            <pc:docMk/>
-            <pc:sldMk cId="1677787951" sldId="307"/>
-            <ac:spMk id="27" creationId="{7D65C8FD-094B-8A21-061B-CD5D69DC6765}"/>
-          </ac:spMkLst>
-        </pc:spChg>
-        <pc:spChg chg="add del mod">
-          <ac:chgData name="PEREZ VERGARA MELANY" userId="S::m.perezvergara@uandresbello.edu::d95698a7-632e-4c03-ab0f-564477513d69" providerId="AD" clId="Web-{512BB393-AFC8-321A-CA6F-0FE68B77EE34}" dt="2024-04-19T01:02:25.225" v="250"/>
-          <ac:spMkLst>
-            <pc:docMk/>
-            <pc:sldMk cId="1677787951" sldId="307"/>
-            <ac:spMk id="28" creationId="{95560FC6-C715-30FC-CD43-D2AADA33EF80}"/>
-          </ac:spMkLst>
-        </pc:spChg>
-        <pc:spChg chg="add mod ord">
-          <ac:chgData name="PEREZ VERGARA MELANY" userId="S::m.perezvergara@uandresbello.edu::d95698a7-632e-4c03-ab0f-564477513d69" providerId="AD" clId="Web-{512BB393-AFC8-321A-CA6F-0FE68B77EE34}" dt="2024-04-19T01:03:40.417" v="262"/>
-          <ac:spMkLst>
-            <pc:docMk/>
-            <pc:sldMk cId="1677787951" sldId="307"/>
-            <ac:spMk id="29" creationId="{4828D22C-CD2B-F23A-8E2B-C31406165D80}"/>
-          </ac:spMkLst>
-        </pc:spChg>
-        <pc:picChg chg="mod modCrop">
-          <ac:chgData name="PEREZ VERGARA MELANY" userId="S::m.perezvergara@uandresbello.edu::d95698a7-632e-4c03-ab0f-564477513d69" providerId="AD" clId="Web-{512BB393-AFC8-321A-CA6F-0FE68B77EE34}" dt="2024-04-19T01:07:24.476" v="278" actId="1076"/>
-          <ac:picMkLst>
-            <pc:docMk/>
-            <pc:sldMk cId="1677787951" sldId="307"/>
-            <ac:picMk id="9" creationId="{8CA17F75-6E6A-44AC-B88D-4A56682EC3B2}"/>
-          </ac:picMkLst>
-        </pc:picChg>
-        <pc:picChg chg="del">
-          <ac:chgData name="PEREZ VERGARA MELANY" userId="S::m.perezvergara@uandresbello.edu::d95698a7-632e-4c03-ab0f-564477513d69" providerId="AD" clId="Web-{512BB393-AFC8-321A-CA6F-0FE68B77EE34}" dt="2024-04-19T00:45:51.953" v="30"/>
-          <ac:picMkLst>
-            <pc:docMk/>
-            <pc:sldMk cId="1677787951" sldId="307"/>
-            <ac:picMk id="13" creationId="{0B2A21D9-80B6-456C-A8D6-7AE3F3558AF4}"/>
-          </ac:picMkLst>
-        </pc:picChg>
-        <pc:picChg chg="add mod">
-          <ac:chgData name="PEREZ VERGARA MELANY" userId="S::m.perezvergara@uandresbello.edu::d95698a7-632e-4c03-ab0f-564477513d69" providerId="AD" clId="Web-{512BB393-AFC8-321A-CA6F-0FE68B77EE34}" dt="2024-04-19T00:55:55.220" v="225"/>
-          <ac:picMkLst>
-            <pc:docMk/>
-            <pc:sldMk cId="1677787951" sldId="307"/>
-            <ac:picMk id="24" creationId="{71F5FAC3-5BF7-B3F9-A2BF-90FCBEB5A94B}"/>
-          </ac:picMkLst>
-        </pc:picChg>
-        <pc:picChg chg="add mod">
-          <ac:chgData name="PEREZ VERGARA MELANY" userId="S::m.perezvergara@uandresbello.edu::d95698a7-632e-4c03-ab0f-564477513d69" providerId="AD" clId="Web-{512BB393-AFC8-321A-CA6F-0FE68B77EE34}" dt="2024-04-19T00:55:55.236" v="226"/>
-          <ac:picMkLst>
-            <pc:docMk/>
-            <pc:sldMk cId="1677787951" sldId="307"/>
-            <ac:picMk id="25" creationId="{208DBB9B-9953-D867-60BD-E4A1D5F4DD94}"/>
-          </ac:picMkLst>
-        </pc:picChg>
-        <pc:picChg chg="add mod modCrop">
-          <ac:chgData name="PEREZ VERGARA MELANY" userId="S::m.perezvergara@uandresbello.edu::d95698a7-632e-4c03-ab0f-564477513d69" providerId="AD" clId="Web-{512BB393-AFC8-321A-CA6F-0FE68B77EE34}" dt="2024-04-19T01:01:29.535" v="240"/>
-          <ac:picMkLst>
-            <pc:docMk/>
-            <pc:sldMk cId="1677787951" sldId="307"/>
-            <ac:picMk id="26" creationId="{E0ECE6FA-740B-8DC5-BB34-B58A16FF7C5E}"/>
-          </ac:picMkLst>
-        </pc:picChg>
-        <pc:picChg chg="add mod modCrop">
-          <ac:chgData name="PEREZ VERGARA MELANY" userId="S::m.perezvergara@uandresbello.edu::d95698a7-632e-4c03-ab0f-564477513d69" providerId="AD" clId="Web-{512BB393-AFC8-321A-CA6F-0FE68B77EE34}" dt="2024-04-19T01:06:56.490" v="273"/>
-          <ac:picMkLst>
-            <pc:docMk/>
-            <pc:sldMk cId="1677787951" sldId="307"/>
-            <ac:picMk id="30" creationId="{15400110-8BB1-8BBE-26F2-849DFE643E9E}"/>
-          </ac:picMkLst>
-        </pc:picChg>
-        <pc:cxnChg chg="del">
-          <ac:chgData name="PEREZ VERGARA MELANY" userId="S::m.perezvergara@uandresbello.edu::d95698a7-632e-4c03-ab0f-564477513d69" providerId="AD" clId="Web-{512BB393-AFC8-321A-CA6F-0FE68B77EE34}" dt="2024-04-19T00:45:46.953" v="27"/>
-          <ac:cxnSpMkLst>
-            <pc:docMk/>
-            <pc:sldMk cId="1677787951" sldId="307"/>
-            <ac:cxnSpMk id="14" creationId="{1585265B-4E00-434F-A644-ADFF1F48468A}"/>
-          </ac:cxnSpMkLst>
-        </pc:cxnChg>
-        <pc:cxnChg chg="del">
-          <ac:chgData name="PEREZ VERGARA MELANY" userId="S::m.perezvergara@uandresbello.edu::d95698a7-632e-4c03-ab0f-564477513d69" providerId="AD" clId="Web-{512BB393-AFC8-321A-CA6F-0FE68B77EE34}" dt="2024-04-19T00:45:48.312" v="28"/>
-          <ac:cxnSpMkLst>
-            <pc:docMk/>
-            <pc:sldMk cId="1677787951" sldId="307"/>
-            <ac:cxnSpMk id="15" creationId="{5B64C4A8-E34F-4E93-9BA1-1925F378EC3D}"/>
-          </ac:cxnSpMkLst>
-        </pc:cxnChg>
-        <pc:cxnChg chg="del">
-          <ac:chgData name="PEREZ VERGARA MELANY" userId="S::m.perezvergara@uandresbello.edu::d95698a7-632e-4c03-ab0f-564477513d69" providerId="AD" clId="Web-{512BB393-AFC8-321A-CA6F-0FE68B77EE34}" dt="2024-04-19T00:46:09.126" v="36"/>
-          <ac:cxnSpMkLst>
-            <pc:docMk/>
-            <pc:sldMk cId="1677787951" sldId="307"/>
-            <ac:cxnSpMk id="16" creationId="{122064AE-3A3A-4F63-800C-6648A2ADA6BE}"/>
-          </ac:cxnSpMkLst>
-        </pc:cxnChg>
-        <pc:cxnChg chg="del">
-          <ac:chgData name="PEREZ VERGARA MELANY" userId="S::m.perezvergara@uandresbello.edu::d95698a7-632e-4c03-ab0f-564477513d69" providerId="AD" clId="Web-{512BB393-AFC8-321A-CA6F-0FE68B77EE34}" dt="2024-04-19T00:46:05.079" v="34"/>
-          <ac:cxnSpMkLst>
-            <pc:docMk/>
-            <pc:sldMk cId="1677787951" sldId="307"/>
-            <ac:cxnSpMk id="18" creationId="{6B53EC84-3601-4293-B749-A2BC2795B17D}"/>
-          </ac:cxnSpMkLst>
-        </pc:cxnChg>
-        <pc:cxnChg chg="del mod">
-          <ac:chgData name="PEREZ VERGARA MELANY" userId="S::m.perezvergara@uandresbello.edu::d95698a7-632e-4c03-ab0f-564477513d69" providerId="AD" clId="Web-{512BB393-AFC8-321A-CA6F-0FE68B77EE34}" dt="2024-04-19T00:46:03.391" v="33"/>
-          <ac:cxnSpMkLst>
-            <pc:docMk/>
-            <pc:sldMk cId="1677787951" sldId="307"/>
-            <ac:cxnSpMk id="22" creationId="{6A7DB234-E311-4E3B-AE05-EF5CB163CB48}"/>
-          </ac:cxnSpMkLst>
-        </pc:cxnChg>
-      </pc:sldChg>
-      <pc:sldChg chg="modSp add replId">
-        <pc:chgData name="PEREZ VERGARA MELANY" userId="S::m.perezvergara@uandresbello.edu::d95698a7-632e-4c03-ab0f-564477513d69" providerId="AD" clId="Web-{512BB393-AFC8-321A-CA6F-0FE68B77EE34}" dt="2024-04-19T01:08:57.684" v="281" actId="20577"/>
-        <pc:sldMkLst>
-          <pc:docMk/>
-          <pc:sldMk cId="1128333449" sldId="312"/>
-        </pc:sldMkLst>
-        <pc:spChg chg="mod">
-          <ac:chgData name="PEREZ VERGARA MELANY" userId="S::m.perezvergara@uandresbello.edu::d95698a7-632e-4c03-ab0f-564477513d69" providerId="AD" clId="Web-{512BB393-AFC8-321A-CA6F-0FE68B77EE34}" dt="2024-04-19T01:08:57.684" v="281" actId="20577"/>
-          <ac:spMkLst>
-            <pc:docMk/>
-            <pc:sldMk cId="1128333449" sldId="312"/>
-            <ac:spMk id="8" creationId="{8E5AB793-981F-4F0C-993F-B574912D895B}"/>
-          </ac:spMkLst>
-        </pc:spChg>
-      </pc:sldChg>
-      <pc:sldChg chg="addSp delSp modSp add replId">
-        <pc:chgData name="PEREZ VERGARA MELANY" userId="S::m.perezvergara@uandresbello.edu::d95698a7-632e-4c03-ab0f-564477513d69" providerId="AD" clId="Web-{512BB393-AFC8-321A-CA6F-0FE68B77EE34}" dt="2024-04-19T01:46:43.063" v="740" actId="20577"/>
-        <pc:sldMkLst>
-          <pc:docMk/>
-          <pc:sldMk cId="319540435" sldId="313"/>
-        </pc:sldMkLst>
-        <pc:spChg chg="del">
-          <ac:chgData name="PEREZ VERGARA MELANY" userId="S::m.perezvergara@uandresbello.edu::d95698a7-632e-4c03-ab0f-564477513d69" providerId="AD" clId="Web-{512BB393-AFC8-321A-CA6F-0FE68B77EE34}" dt="2024-04-19T01:10:09.204" v="297"/>
-          <ac:spMkLst>
-            <pc:docMk/>
-            <pc:sldMk cId="319540435" sldId="313"/>
-            <ac:spMk id="2" creationId="{89F7B28D-E55B-A156-E75F-6B7FAAC53BF2}"/>
-          </ac:spMkLst>
-        </pc:spChg>
-        <pc:spChg chg="del">
-          <ac:chgData name="PEREZ VERGARA MELANY" userId="S::m.perezvergara@uandresbello.edu::d95698a7-632e-4c03-ab0f-564477513d69" providerId="AD" clId="Web-{512BB393-AFC8-321A-CA6F-0FE68B77EE34}" dt="2024-04-19T01:09:45.843" v="283"/>
-          <ac:spMkLst>
-            <pc:docMk/>
-            <pc:sldMk cId="319540435" sldId="313"/>
-            <ac:spMk id="3" creationId="{D475482D-7F09-DE4F-FF9A-2C7FBEF94594}"/>
-          </ac:spMkLst>
-        </pc:spChg>
-        <pc:spChg chg="add mod">
-          <ac:chgData name="PEREZ VERGARA MELANY" userId="S::m.perezvergara@uandresbello.edu::d95698a7-632e-4c03-ab0f-564477513d69" providerId="AD" clId="Web-{512BB393-AFC8-321A-CA6F-0FE68B77EE34}" dt="2024-04-19T01:38:23.076" v="709" actId="1076"/>
-          <ac:spMkLst>
-            <pc:docMk/>
-            <pc:sldMk cId="319540435" sldId="313"/>
-            <ac:spMk id="4" creationId="{631823CF-BC2F-D4EC-5405-A6FDF562CE09}"/>
-          </ac:spMkLst>
-        </pc:spChg>
-        <pc:spChg chg="del mod">
-          <ac:chgData name="PEREZ VERGARA MELANY" userId="S::m.perezvergara@uandresbello.edu::d95698a7-632e-4c03-ab0f-564477513d69" providerId="AD" clId="Web-{512BB393-AFC8-321A-CA6F-0FE68B77EE34}" dt="2024-04-19T01:10:15.079" v="300"/>
-          <ac:spMkLst>
-            <pc:docMk/>
-            <pc:sldMk cId="319540435" sldId="313"/>
-            <ac:spMk id="5" creationId="{699E2788-EBE2-45DF-9C0B-D666080A46A9}"/>
-          </ac:spMkLst>
-        </pc:spChg>
-        <pc:spChg chg="del mod">
-          <ac:chgData name="PEREZ VERGARA MELANY" userId="S::m.perezvergara@uandresbello.edu::d95698a7-632e-4c03-ab0f-564477513d69" providerId="AD" clId="Web-{512BB393-AFC8-321A-CA6F-0FE68B77EE34}" dt="2024-04-19T01:10:05.188" v="295"/>
-          <ac:spMkLst>
-            <pc:docMk/>
-            <pc:sldMk cId="319540435" sldId="313"/>
-            <ac:spMk id="6" creationId="{9DEC9D77-6AA7-4B6B-881C-F31DAAE1DB2A}"/>
-          </ac:spMkLst>
-        </pc:spChg>
-        <pc:spChg chg="del">
-          <ac:chgData name="PEREZ VERGARA MELANY" userId="S::m.perezvergara@uandresbello.edu::d95698a7-632e-4c03-ab0f-564477513d69" providerId="AD" clId="Web-{512BB393-AFC8-321A-CA6F-0FE68B77EE34}" dt="2024-04-19T01:10:32.861" v="311"/>
-          <ac:spMkLst>
-            <pc:docMk/>
-            <pc:sldMk cId="319540435" sldId="313"/>
-            <ac:spMk id="8" creationId="{8E5AB793-981F-4F0C-993F-B574912D895B}"/>
-          </ac:spMkLst>
-        </pc:spChg>
-        <pc:spChg chg="del">
-          <ac:chgData name="PEREZ VERGARA MELANY" userId="S::m.perezvergara@uandresbello.edu::d95698a7-632e-4c03-ab0f-564477513d69" providerId="AD" clId="Web-{512BB393-AFC8-321A-CA6F-0FE68B77EE34}" dt="2024-04-19T01:09:54.968" v="286"/>
-          <ac:spMkLst>
-            <pc:docMk/>
-            <pc:sldMk cId="319540435" sldId="313"/>
-            <ac:spMk id="10" creationId="{DC1D303F-E600-4ACE-9AB7-C6AEB05050D4}"/>
-          </ac:spMkLst>
-        </pc:spChg>
-        <pc:spChg chg="del mod">
-          <ac:chgData name="PEREZ VERGARA MELANY" userId="S::m.perezvergara@uandresbello.edu::d95698a7-632e-4c03-ab0f-564477513d69" providerId="AD" clId="Web-{512BB393-AFC8-321A-CA6F-0FE68B77EE34}" dt="2024-04-19T01:10:07.110" v="296"/>
-          <ac:spMkLst>
-            <pc:docMk/>
-            <pc:sldMk cId="319540435" sldId="313"/>
-            <ac:spMk id="11" creationId="{ACB6F962-DADC-4482-8A69-766A19968AF5}"/>
-          </ac:spMkLst>
-        </pc:spChg>
-        <pc:spChg chg="mod">
-          <ac:chgData name="PEREZ VERGARA MELANY" userId="S::m.perezvergara@uandresbello.edu::d95698a7-632e-4c03-ab0f-564477513d69" providerId="AD" clId="Web-{512BB393-AFC8-321A-CA6F-0FE68B77EE34}" dt="2024-04-19T01:10:51.190" v="326" actId="20577"/>
-          <ac:spMkLst>
-            <pc:docMk/>
-            <pc:sldMk cId="319540435" sldId="313"/>
-            <ac:spMk id="12" creationId="{A3A365B2-B2DE-4D2C-92CE-32C0611969DB}"/>
-          </ac:spMkLst>
-        </pc:spChg>
-        <pc:spChg chg="add mod">
-          <ac:chgData name="PEREZ VERGARA MELANY" userId="S::m.perezvergara@uandresbello.edu::d95698a7-632e-4c03-ab0f-564477513d69" providerId="AD" clId="Web-{512BB393-AFC8-321A-CA6F-0FE68B77EE34}" dt="2024-04-19T01:30:03.830" v="483" actId="20577"/>
-          <ac:spMkLst>
-            <pc:docMk/>
-            <pc:sldMk cId="319540435" sldId="313"/>
-            <ac:spMk id="17" creationId="{1FCC3FBF-86B2-0BB3-B8FA-409661665625}"/>
-          </ac:spMkLst>
-        </pc:spChg>
-        <pc:spChg chg="del">
-          <ac:chgData name="PEREZ VERGARA MELANY" userId="S::m.perezvergara@uandresbello.edu::d95698a7-632e-4c03-ab0f-564477513d69" providerId="AD" clId="Web-{512BB393-AFC8-321A-CA6F-0FE68B77EE34}" dt="2024-04-19T01:10:25.048" v="307"/>
-          <ac:spMkLst>
-            <pc:docMk/>
-            <pc:sldMk cId="319540435" sldId="313"/>
-            <ac:spMk id="19" creationId="{9052CB31-5E86-43F7-9E18-68D97336D3DC}"/>
-          </ac:spMkLst>
-        </pc:spChg>
-        <pc:spChg chg="del">
-          <ac:chgData name="PEREZ VERGARA MELANY" userId="S::m.perezvergara@uandresbello.edu::d95698a7-632e-4c03-ab0f-564477513d69" providerId="AD" clId="Web-{512BB393-AFC8-321A-CA6F-0FE68B77EE34}" dt="2024-04-19T01:10:30.642" v="310"/>
-          <ac:spMkLst>
-            <pc:docMk/>
-            <pc:sldMk cId="319540435" sldId="313"/>
-            <ac:spMk id="20" creationId="{BF49D49A-95BF-4D21-AE29-BD9D704FEC5F}"/>
-          </ac:spMkLst>
-        </pc:spChg>
-        <pc:spChg chg="del">
-          <ac:chgData name="PEREZ VERGARA MELANY" userId="S::m.perezvergara@uandresbello.edu::d95698a7-632e-4c03-ab0f-564477513d69" providerId="AD" clId="Web-{512BB393-AFC8-321A-CA6F-0FE68B77EE34}" dt="2024-04-19T01:09:57.687" v="290"/>
-          <ac:spMkLst>
-            <pc:docMk/>
-            <pc:sldMk cId="319540435" sldId="313"/>
-            <ac:spMk id="21" creationId="{6A548F58-8CF8-4D0C-8871-44C1700A4D4B}"/>
-          </ac:spMkLst>
-        </pc:spChg>
-        <pc:spChg chg="add del mod">
-          <ac:chgData name="PEREZ VERGARA MELANY" userId="S::m.perezvergara@uandresbello.edu::d95698a7-632e-4c03-ab0f-564477513d69" providerId="AD" clId="Web-{512BB393-AFC8-321A-CA6F-0FE68B77EE34}" dt="2024-04-19T01:38:28.873" v="711" actId="1076"/>
-          <ac:spMkLst>
-            <pc:docMk/>
-            <pc:sldMk cId="319540435" sldId="313"/>
-            <ac:spMk id="23" creationId="{73182A38-D6DF-453D-921E-315EFA20E2ED}"/>
-          </ac:spMkLst>
-        </pc:spChg>
-        <pc:spChg chg="add mod">
-          <ac:chgData name="PEREZ VERGARA MELANY" userId="S::m.perezvergara@uandresbello.edu::d95698a7-632e-4c03-ab0f-564477513d69" providerId="AD" clId="Web-{512BB393-AFC8-321A-CA6F-0FE68B77EE34}" dt="2024-04-19T01:46:43.063" v="740" actId="20577"/>
-          <ac:spMkLst>
-            <pc:docMk/>
-            <pc:sldMk cId="319540435" sldId="313"/>
-            <ac:spMk id="24" creationId="{BA18F6DF-CBB0-C049-F795-5FBA7BFF080B}"/>
-          </ac:spMkLst>
-        </pc:spChg>
-        <pc:picChg chg="del">
-          <ac:chgData name="PEREZ VERGARA MELANY" userId="S::m.perezvergara@uandresbello.edu::d95698a7-632e-4c03-ab0f-564477513d69" providerId="AD" clId="Web-{512BB393-AFC8-321A-CA6F-0FE68B77EE34}" dt="2024-04-19T01:09:55.625" v="287"/>
-          <ac:picMkLst>
-            <pc:docMk/>
-            <pc:sldMk cId="319540435" sldId="313"/>
-            <ac:picMk id="9" creationId="{8CA17F75-6E6A-44AC-B88D-4A56682EC3B2}"/>
-          </ac:picMkLst>
-        </pc:picChg>
-        <pc:picChg chg="del">
-          <ac:chgData name="PEREZ VERGARA MELANY" userId="S::m.perezvergara@uandresbello.edu::d95698a7-632e-4c03-ab0f-564477513d69" providerId="AD" clId="Web-{512BB393-AFC8-321A-CA6F-0FE68B77EE34}" dt="2024-04-19T01:10:16.954" v="301"/>
-          <ac:picMkLst>
-            <pc:docMk/>
-            <pc:sldMk cId="319540435" sldId="313"/>
-            <ac:picMk id="13" creationId="{0B2A21D9-80B6-456C-A8D6-7AE3F3558AF4}"/>
-          </ac:picMkLst>
-        </pc:picChg>
-        <pc:cxnChg chg="del">
-          <ac:chgData name="PEREZ VERGARA MELANY" userId="S::m.perezvergara@uandresbello.edu::d95698a7-632e-4c03-ab0f-564477513d69" providerId="AD" clId="Web-{512BB393-AFC8-321A-CA6F-0FE68B77EE34}" dt="2024-04-19T01:10:19.642" v="303"/>
-          <ac:cxnSpMkLst>
-            <pc:docMk/>
-            <pc:sldMk cId="319540435" sldId="313"/>
-            <ac:cxnSpMk id="14" creationId="{1585265B-4E00-434F-A644-ADFF1F48468A}"/>
-          </ac:cxnSpMkLst>
-        </pc:cxnChg>
-        <pc:cxnChg chg="del">
-          <ac:chgData name="PEREZ VERGARA MELANY" userId="S::m.perezvergara@uandresbello.edu::d95698a7-632e-4c03-ab0f-564477513d69" providerId="AD" clId="Web-{512BB393-AFC8-321A-CA6F-0FE68B77EE34}" dt="2024-04-19T01:10:21.048" v="304"/>
-          <ac:cxnSpMkLst>
-            <pc:docMk/>
-            <pc:sldMk cId="319540435" sldId="313"/>
-            <ac:cxnSpMk id="15" creationId="{5B64C4A8-E34F-4E93-9BA1-1925F378EC3D}"/>
-          </ac:cxnSpMkLst>
-        </pc:cxnChg>
-        <pc:cxnChg chg="del">
-          <ac:chgData name="PEREZ VERGARA MELANY" userId="S::m.perezvergara@uandresbello.edu::d95698a7-632e-4c03-ab0f-564477513d69" providerId="AD" clId="Web-{512BB393-AFC8-321A-CA6F-0FE68B77EE34}" dt="2024-04-19T01:10:27.611" v="308"/>
-          <ac:cxnSpMkLst>
-            <pc:docMk/>
-            <pc:sldMk cId="319540435" sldId="313"/>
-            <ac:cxnSpMk id="16" creationId="{122064AE-3A3A-4F63-800C-6648A2ADA6BE}"/>
-          </ac:cxnSpMkLst>
-        </pc:cxnChg>
-        <pc:cxnChg chg="del">
-          <ac:chgData name="PEREZ VERGARA MELANY" userId="S::m.perezvergara@uandresbello.edu::d95698a7-632e-4c03-ab0f-564477513d69" providerId="AD" clId="Web-{512BB393-AFC8-321A-CA6F-0FE68B77EE34}" dt="2024-04-19T01:10:29.095" v="309"/>
-          <ac:cxnSpMkLst>
-            <pc:docMk/>
-            <pc:sldMk cId="319540435" sldId="313"/>
-            <ac:cxnSpMk id="18" creationId="{6B53EC84-3601-4293-B749-A2BC2795B17D}"/>
-          </ac:cxnSpMkLst>
-        </pc:cxnChg>
-        <pc:cxnChg chg="del mod">
-          <ac:chgData name="PEREZ VERGARA MELANY" userId="S::m.perezvergara@uandresbello.edu::d95698a7-632e-4c03-ab0f-564477513d69" providerId="AD" clId="Web-{512BB393-AFC8-321A-CA6F-0FE68B77EE34}" dt="2024-04-19T01:10:18.095" v="302"/>
-          <ac:cxnSpMkLst>
-            <pc:docMk/>
-            <pc:sldMk cId="319540435" sldId="313"/>
-            <ac:cxnSpMk id="22" creationId="{6A7DB234-E311-4E3B-AE05-EF5CB163CB48}"/>
-          </ac:cxnSpMkLst>
-        </pc:cxnChg>
-      </pc:sldChg>
-    </pc:docChg>
-  </pc:docChgLst>
-  <pc:docChgLst>
     <pc:chgData name="VÁSQUEZ CARVAJAL GONZALO A" userId="S::g.vsquezcarvajal@uandresbello.edu::fdf6c519-ebfd-465d-b4fa-917b5c704028" providerId="AD" clId="Web-{CCE71196-D9EA-5FF5-3E05-183E6D1705FC}"/>
     <pc:docChg chg="modSld">
       <pc:chgData name="VÁSQUEZ CARVAJAL GONZALO A" userId="S::g.vsquezcarvajal@uandresbello.edu::fdf6c519-ebfd-465d-b4fa-917b5c704028" providerId="AD" clId="Web-{CCE71196-D9EA-5FF5-3E05-183E6D1705FC}" dt="2024-04-19T02:33:07.451" v="6" actId="1076"/>
@@ -735,6 +245,491 @@
             <ac:picMk id="31" creationId="{637CF5E8-ABB0-22A1-D946-FDFCE8232FD1}"/>
           </ac:picMkLst>
         </pc:picChg>
+      </pc:sldChg>
+    </pc:docChg>
+  </pc:docChgLst>
+  <pc:docChgLst>
+    <pc:chgData name="PEREZ VERGARA MELANY" userId="S::m.perezvergara@uandresbello.edu::d95698a7-632e-4c03-ab0f-564477513d69" providerId="AD" clId="Web-{512BB393-AFC8-321A-CA6F-0FE68B77EE34}"/>
+    <pc:docChg chg="addSld modSld">
+      <pc:chgData name="PEREZ VERGARA MELANY" userId="S::m.perezvergara@uandresbello.edu::d95698a7-632e-4c03-ab0f-564477513d69" providerId="AD" clId="Web-{512BB393-AFC8-321A-CA6F-0FE68B77EE34}" dt="2024-04-19T01:55:38.091" v="766" actId="20577"/>
+      <pc:docMkLst>
+        <pc:docMk/>
+      </pc:docMkLst>
+      <pc:sldChg chg="modSp">
+        <pc:chgData name="PEREZ VERGARA MELANY" userId="S::m.perezvergara@uandresbello.edu::d95698a7-632e-4c03-ab0f-564477513d69" providerId="AD" clId="Web-{512BB393-AFC8-321A-CA6F-0FE68B77EE34}" dt="2024-04-19T01:55:38.091" v="766" actId="20577"/>
+        <pc:sldMkLst>
+          <pc:docMk/>
+          <pc:sldMk cId="4002806811" sldId="305"/>
+        </pc:sldMkLst>
+        <pc:spChg chg="mod">
+          <ac:chgData name="PEREZ VERGARA MELANY" userId="S::m.perezvergara@uandresbello.edu::d95698a7-632e-4c03-ab0f-564477513d69" providerId="AD" clId="Web-{512BB393-AFC8-321A-CA6F-0FE68B77EE34}" dt="2024-04-19T01:55:38.091" v="766" actId="20577"/>
+          <ac:spMkLst>
+            <pc:docMk/>
+            <pc:sldMk cId="4002806811" sldId="305"/>
+            <ac:spMk id="46" creationId="{407ACAF3-9F46-4590-BB27-0A76A5E37EF0}"/>
+          </ac:spMkLst>
+        </pc:spChg>
+        <pc:spChg chg="mod">
+          <ac:chgData name="PEREZ VERGARA MELANY" userId="S::m.perezvergara@uandresbello.edu::d95698a7-632e-4c03-ab0f-564477513d69" providerId="AD" clId="Web-{512BB393-AFC8-321A-CA6F-0FE68B77EE34}" dt="2024-04-19T01:54:55.167" v="758" actId="20577"/>
+          <ac:spMkLst>
+            <pc:docMk/>
+            <pc:sldMk cId="4002806811" sldId="305"/>
+            <ac:spMk id="78" creationId="{01A187E2-50D2-4CF9-BEC4-99ED7D9D1517}"/>
+          </ac:spMkLst>
+        </pc:spChg>
+      </pc:sldChg>
+      <pc:sldChg chg="addSp delSp modSp">
+        <pc:chgData name="PEREZ VERGARA MELANY" userId="S::m.perezvergara@uandresbello.edu::d95698a7-632e-4c03-ab0f-564477513d69" providerId="AD" clId="Web-{512BB393-AFC8-321A-CA6F-0FE68B77EE34}" dt="2024-04-19T01:07:30.976" v="279" actId="1076"/>
+        <pc:sldMkLst>
+          <pc:docMk/>
+          <pc:sldMk cId="1677787951" sldId="307"/>
+        </pc:sldMkLst>
+        <pc:spChg chg="del">
+          <ac:chgData name="PEREZ VERGARA MELANY" userId="S::m.perezvergara@uandresbello.edu::d95698a7-632e-4c03-ab0f-564477513d69" providerId="AD" clId="Web-{512BB393-AFC8-321A-CA6F-0FE68B77EE34}" dt="2024-04-19T00:42:44.457" v="26"/>
+          <ac:spMkLst>
+            <pc:docMk/>
+            <pc:sldMk cId="1677787951" sldId="307"/>
+            <ac:spMk id="2" creationId="{89F7B28D-E55B-A156-E75F-6B7FAAC53BF2}"/>
+          </ac:spMkLst>
+        </pc:spChg>
+        <pc:spChg chg="del">
+          <ac:chgData name="PEREZ VERGARA MELANY" userId="S::m.perezvergara@uandresbello.edu::d95698a7-632e-4c03-ab0f-564477513d69" providerId="AD" clId="Web-{512BB393-AFC8-321A-CA6F-0FE68B77EE34}" dt="2024-04-19T00:42:41.363" v="25"/>
+          <ac:spMkLst>
+            <pc:docMk/>
+            <pc:sldMk cId="1677787951" sldId="307"/>
+            <ac:spMk id="3" creationId="{D475482D-7F09-DE4F-FF9A-2C7FBEF94594}"/>
+          </ac:spMkLst>
+        </pc:spChg>
+        <pc:spChg chg="add mod">
+          <ac:chgData name="PEREZ VERGARA MELANY" userId="S::m.perezvergara@uandresbello.edu::d95698a7-632e-4c03-ab0f-564477513d69" providerId="AD" clId="Web-{512BB393-AFC8-321A-CA6F-0FE68B77EE34}" dt="2024-04-19T01:01:44.676" v="244" actId="1076"/>
+          <ac:spMkLst>
+            <pc:docMk/>
+            <pc:sldMk cId="1677787951" sldId="307"/>
+            <ac:spMk id="4" creationId="{D4E280EB-7A2F-4C18-150A-38B298C950B4}"/>
+          </ac:spMkLst>
+        </pc:spChg>
+        <pc:spChg chg="mod">
+          <ac:chgData name="PEREZ VERGARA MELANY" userId="S::m.perezvergara@uandresbello.edu::d95698a7-632e-4c03-ab0f-564477513d69" providerId="AD" clId="Web-{512BB393-AFC8-321A-CA6F-0FE68B77EE34}" dt="2024-04-19T01:01:38.676" v="243"/>
+          <ac:spMkLst>
+            <pc:docMk/>
+            <pc:sldMk cId="1677787951" sldId="307"/>
+            <ac:spMk id="5" creationId="{699E2788-EBE2-45DF-9C0B-D666080A46A9}"/>
+          </ac:spMkLst>
+        </pc:spChg>
+        <pc:spChg chg="del mod">
+          <ac:chgData name="PEREZ VERGARA MELANY" userId="S::m.perezvergara@uandresbello.edu::d95698a7-632e-4c03-ab0f-564477513d69" providerId="AD" clId="Web-{512BB393-AFC8-321A-CA6F-0FE68B77EE34}" dt="2024-04-19T00:42:36.879" v="24"/>
+          <ac:spMkLst>
+            <pc:docMk/>
+            <pc:sldMk cId="1677787951" sldId="307"/>
+            <ac:spMk id="6" creationId="{9DEC9D77-6AA7-4B6B-881C-F31DAAE1DB2A}"/>
+          </ac:spMkLst>
+        </pc:spChg>
+        <pc:spChg chg="add mod">
+          <ac:chgData name="PEREZ VERGARA MELANY" userId="S::m.perezvergara@uandresbello.edu::d95698a7-632e-4c03-ab0f-564477513d69" providerId="AD" clId="Web-{512BB393-AFC8-321A-CA6F-0FE68B77EE34}" dt="2024-04-19T01:03:49.292" v="264" actId="1076"/>
+          <ac:spMkLst>
+            <pc:docMk/>
+            <pc:sldMk cId="1677787951" sldId="307"/>
+            <ac:spMk id="7" creationId="{96739617-0171-F356-FA57-24597D06AC62}"/>
+          </ac:spMkLst>
+        </pc:spChg>
+        <pc:spChg chg="del">
+          <ac:chgData name="PEREZ VERGARA MELANY" userId="S::m.perezvergara@uandresbello.edu::d95698a7-632e-4c03-ab0f-564477513d69" providerId="AD" clId="Web-{512BB393-AFC8-321A-CA6F-0FE68B77EE34}" dt="2024-04-19T00:45:59.907" v="31"/>
+          <ac:spMkLst>
+            <pc:docMk/>
+            <pc:sldMk cId="1677787951" sldId="307"/>
+            <ac:spMk id="8" creationId="{8E5AB793-981F-4F0C-993F-B574912D895B}"/>
+          </ac:spMkLst>
+        </pc:spChg>
+        <pc:spChg chg="mod">
+          <ac:chgData name="PEREZ VERGARA MELANY" userId="S::m.perezvergara@uandresbello.edu::d95698a7-632e-4c03-ab0f-564477513d69" providerId="AD" clId="Web-{512BB393-AFC8-321A-CA6F-0FE68B77EE34}" dt="2024-04-19T01:07:30.976" v="279" actId="1076"/>
+          <ac:spMkLst>
+            <pc:docMk/>
+            <pc:sldMk cId="1677787951" sldId="307"/>
+            <ac:spMk id="10" creationId="{DC1D303F-E600-4ACE-9AB7-C6AEB05050D4}"/>
+          </ac:spMkLst>
+        </pc:spChg>
+        <pc:spChg chg="add mod">
+          <ac:chgData name="PEREZ VERGARA MELANY" userId="S::m.perezvergara@uandresbello.edu::d95698a7-632e-4c03-ab0f-564477513d69" providerId="AD" clId="Web-{512BB393-AFC8-321A-CA6F-0FE68B77EE34}" dt="2024-04-19T01:04:02.481" v="265" actId="1076"/>
+          <ac:spMkLst>
+            <pc:docMk/>
+            <pc:sldMk cId="1677787951" sldId="307"/>
+            <ac:spMk id="11" creationId="{121DDE4A-F080-BD75-0314-DE2CD23B7C0D}"/>
+          </ac:spMkLst>
+        </pc:spChg>
+        <pc:spChg chg="del mod">
+          <ac:chgData name="PEREZ VERGARA MELANY" userId="S::m.perezvergara@uandresbello.edu::d95698a7-632e-4c03-ab0f-564477513d69" providerId="AD" clId="Web-{512BB393-AFC8-321A-CA6F-0FE68B77EE34}" dt="2024-04-19T00:21:15.398" v="9"/>
+          <ac:spMkLst>
+            <pc:docMk/>
+            <pc:sldMk cId="1677787951" sldId="307"/>
+            <ac:spMk id="11" creationId="{ACB6F962-DADC-4482-8A69-766A19968AF5}"/>
+          </ac:spMkLst>
+        </pc:spChg>
+        <pc:spChg chg="del">
+          <ac:chgData name="PEREZ VERGARA MELANY" userId="S::m.perezvergara@uandresbello.edu::d95698a7-632e-4c03-ab0f-564477513d69" providerId="AD" clId="Web-{512BB393-AFC8-321A-CA6F-0FE68B77EE34}" dt="2024-04-19T00:22:39.620" v="12"/>
+          <ac:spMkLst>
+            <pc:docMk/>
+            <pc:sldMk cId="1677787951" sldId="307"/>
+            <ac:spMk id="12" creationId="{A3A365B2-B2DE-4D2C-92CE-32C0611969DB}"/>
+          </ac:spMkLst>
+        </pc:spChg>
+        <pc:spChg chg="add mod">
+          <ac:chgData name="PEREZ VERGARA MELANY" userId="S::m.perezvergara@uandresbello.edu::d95698a7-632e-4c03-ab0f-564477513d69" providerId="AD" clId="Web-{512BB393-AFC8-321A-CA6F-0FE68B77EE34}" dt="2024-04-19T01:07:04.272" v="274" actId="20577"/>
+          <ac:spMkLst>
+            <pc:docMk/>
+            <pc:sldMk cId="1677787951" sldId="307"/>
+            <ac:spMk id="12" creationId="{FCD74C54-A2BA-C62A-8C3D-6FBB66913252}"/>
+          </ac:spMkLst>
+        </pc:spChg>
+        <pc:spChg chg="add mod">
+          <ac:chgData name="PEREZ VERGARA MELANY" userId="S::m.perezvergara@uandresbello.edu::d95698a7-632e-4c03-ab0f-564477513d69" providerId="AD" clId="Web-{512BB393-AFC8-321A-CA6F-0FE68B77EE34}" dt="2024-04-19T01:07:16.819" v="277" actId="1076"/>
+          <ac:spMkLst>
+            <pc:docMk/>
+            <pc:sldMk cId="1677787951" sldId="307"/>
+            <ac:spMk id="17" creationId="{3E9CB07A-4474-8A61-287D-570011831083}"/>
+          </ac:spMkLst>
+        </pc:spChg>
+        <pc:spChg chg="del">
+          <ac:chgData name="PEREZ VERGARA MELANY" userId="S::m.perezvergara@uandresbello.edu::d95698a7-632e-4c03-ab0f-564477513d69" providerId="AD" clId="Web-{512BB393-AFC8-321A-CA6F-0FE68B77EE34}" dt="2024-04-19T00:45:50.141" v="29"/>
+          <ac:spMkLst>
+            <pc:docMk/>
+            <pc:sldMk cId="1677787951" sldId="307"/>
+            <ac:spMk id="19" creationId="{9052CB31-5E86-43F7-9E18-68D97336D3DC}"/>
+          </ac:spMkLst>
+        </pc:spChg>
+        <pc:spChg chg="del">
+          <ac:chgData name="PEREZ VERGARA MELANY" userId="S::m.perezvergara@uandresbello.edu::d95698a7-632e-4c03-ab0f-564477513d69" providerId="AD" clId="Web-{512BB393-AFC8-321A-CA6F-0FE68B77EE34}" dt="2024-04-19T00:46:07.204" v="35"/>
+          <ac:spMkLst>
+            <pc:docMk/>
+            <pc:sldMk cId="1677787951" sldId="307"/>
+            <ac:spMk id="20" creationId="{BF49D49A-95BF-4D21-AE29-BD9D704FEC5F}"/>
+          </ac:spMkLst>
+        </pc:spChg>
+        <pc:spChg chg="del">
+          <ac:chgData name="PEREZ VERGARA MELANY" userId="S::m.perezvergara@uandresbello.edu::d95698a7-632e-4c03-ab0f-564477513d69" providerId="AD" clId="Web-{512BB393-AFC8-321A-CA6F-0FE68B77EE34}" dt="2024-04-19T00:46:03.016" v="32"/>
+          <ac:spMkLst>
+            <pc:docMk/>
+            <pc:sldMk cId="1677787951" sldId="307"/>
+            <ac:spMk id="21" creationId="{6A548F58-8CF8-4D0C-8871-44C1700A4D4B}"/>
+          </ac:spMkLst>
+        </pc:spChg>
+        <pc:spChg chg="mod ord">
+          <ac:chgData name="PEREZ VERGARA MELANY" userId="S::m.perezvergara@uandresbello.edu::d95698a7-632e-4c03-ab0f-564477513d69" providerId="AD" clId="Web-{512BB393-AFC8-321A-CA6F-0FE68B77EE34}" dt="2024-04-19T01:03:43.558" v="263"/>
+          <ac:spMkLst>
+            <pc:docMk/>
+            <pc:sldMk cId="1677787951" sldId="307"/>
+            <ac:spMk id="23" creationId="{73182A38-D6DF-453D-921E-315EFA20E2ED}"/>
+          </ac:spMkLst>
+        </pc:spChg>
+        <pc:spChg chg="add del mod ord">
+          <ac:chgData name="PEREZ VERGARA MELANY" userId="S::m.perezvergara@uandresbello.edu::d95698a7-632e-4c03-ab0f-564477513d69" providerId="AD" clId="Web-{512BB393-AFC8-321A-CA6F-0FE68B77EE34}" dt="2024-04-19T01:03:14.384" v="256"/>
+          <ac:spMkLst>
+            <pc:docMk/>
+            <pc:sldMk cId="1677787951" sldId="307"/>
+            <ac:spMk id="27" creationId="{7D65C8FD-094B-8A21-061B-CD5D69DC6765}"/>
+          </ac:spMkLst>
+        </pc:spChg>
+        <pc:spChg chg="add del mod">
+          <ac:chgData name="PEREZ VERGARA MELANY" userId="S::m.perezvergara@uandresbello.edu::d95698a7-632e-4c03-ab0f-564477513d69" providerId="AD" clId="Web-{512BB393-AFC8-321A-CA6F-0FE68B77EE34}" dt="2024-04-19T01:02:25.225" v="250"/>
+          <ac:spMkLst>
+            <pc:docMk/>
+            <pc:sldMk cId="1677787951" sldId="307"/>
+            <ac:spMk id="28" creationId="{95560FC6-C715-30FC-CD43-D2AADA33EF80}"/>
+          </ac:spMkLst>
+        </pc:spChg>
+        <pc:spChg chg="add mod ord">
+          <ac:chgData name="PEREZ VERGARA MELANY" userId="S::m.perezvergara@uandresbello.edu::d95698a7-632e-4c03-ab0f-564477513d69" providerId="AD" clId="Web-{512BB393-AFC8-321A-CA6F-0FE68B77EE34}" dt="2024-04-19T01:03:40.417" v="262"/>
+          <ac:spMkLst>
+            <pc:docMk/>
+            <pc:sldMk cId="1677787951" sldId="307"/>
+            <ac:spMk id="29" creationId="{4828D22C-CD2B-F23A-8E2B-C31406165D80}"/>
+          </ac:spMkLst>
+        </pc:spChg>
+        <pc:picChg chg="mod modCrop">
+          <ac:chgData name="PEREZ VERGARA MELANY" userId="S::m.perezvergara@uandresbello.edu::d95698a7-632e-4c03-ab0f-564477513d69" providerId="AD" clId="Web-{512BB393-AFC8-321A-CA6F-0FE68B77EE34}" dt="2024-04-19T01:07:24.476" v="278" actId="1076"/>
+          <ac:picMkLst>
+            <pc:docMk/>
+            <pc:sldMk cId="1677787951" sldId="307"/>
+            <ac:picMk id="9" creationId="{8CA17F75-6E6A-44AC-B88D-4A56682EC3B2}"/>
+          </ac:picMkLst>
+        </pc:picChg>
+        <pc:picChg chg="del">
+          <ac:chgData name="PEREZ VERGARA MELANY" userId="S::m.perezvergara@uandresbello.edu::d95698a7-632e-4c03-ab0f-564477513d69" providerId="AD" clId="Web-{512BB393-AFC8-321A-CA6F-0FE68B77EE34}" dt="2024-04-19T00:45:51.953" v="30"/>
+          <ac:picMkLst>
+            <pc:docMk/>
+            <pc:sldMk cId="1677787951" sldId="307"/>
+            <ac:picMk id="13" creationId="{0B2A21D9-80B6-456C-A8D6-7AE3F3558AF4}"/>
+          </ac:picMkLst>
+        </pc:picChg>
+        <pc:picChg chg="add mod">
+          <ac:chgData name="PEREZ VERGARA MELANY" userId="S::m.perezvergara@uandresbello.edu::d95698a7-632e-4c03-ab0f-564477513d69" providerId="AD" clId="Web-{512BB393-AFC8-321A-CA6F-0FE68B77EE34}" dt="2024-04-19T00:55:55.220" v="225"/>
+          <ac:picMkLst>
+            <pc:docMk/>
+            <pc:sldMk cId="1677787951" sldId="307"/>
+            <ac:picMk id="24" creationId="{71F5FAC3-5BF7-B3F9-A2BF-90FCBEB5A94B}"/>
+          </ac:picMkLst>
+        </pc:picChg>
+        <pc:picChg chg="add mod">
+          <ac:chgData name="PEREZ VERGARA MELANY" userId="S::m.perezvergara@uandresbello.edu::d95698a7-632e-4c03-ab0f-564477513d69" providerId="AD" clId="Web-{512BB393-AFC8-321A-CA6F-0FE68B77EE34}" dt="2024-04-19T00:55:55.236" v="226"/>
+          <ac:picMkLst>
+            <pc:docMk/>
+            <pc:sldMk cId="1677787951" sldId="307"/>
+            <ac:picMk id="25" creationId="{208DBB9B-9953-D867-60BD-E4A1D5F4DD94}"/>
+          </ac:picMkLst>
+        </pc:picChg>
+        <pc:picChg chg="add mod modCrop">
+          <ac:chgData name="PEREZ VERGARA MELANY" userId="S::m.perezvergara@uandresbello.edu::d95698a7-632e-4c03-ab0f-564477513d69" providerId="AD" clId="Web-{512BB393-AFC8-321A-CA6F-0FE68B77EE34}" dt="2024-04-19T01:01:29.535" v="240"/>
+          <ac:picMkLst>
+            <pc:docMk/>
+            <pc:sldMk cId="1677787951" sldId="307"/>
+            <ac:picMk id="26" creationId="{E0ECE6FA-740B-8DC5-BB34-B58A16FF7C5E}"/>
+          </ac:picMkLst>
+        </pc:picChg>
+        <pc:picChg chg="add mod modCrop">
+          <ac:chgData name="PEREZ VERGARA MELANY" userId="S::m.perezvergara@uandresbello.edu::d95698a7-632e-4c03-ab0f-564477513d69" providerId="AD" clId="Web-{512BB393-AFC8-321A-CA6F-0FE68B77EE34}" dt="2024-04-19T01:06:56.490" v="273"/>
+          <ac:picMkLst>
+            <pc:docMk/>
+            <pc:sldMk cId="1677787951" sldId="307"/>
+            <ac:picMk id="30" creationId="{15400110-8BB1-8BBE-26F2-849DFE643E9E}"/>
+          </ac:picMkLst>
+        </pc:picChg>
+        <pc:cxnChg chg="del">
+          <ac:chgData name="PEREZ VERGARA MELANY" userId="S::m.perezvergara@uandresbello.edu::d95698a7-632e-4c03-ab0f-564477513d69" providerId="AD" clId="Web-{512BB393-AFC8-321A-CA6F-0FE68B77EE34}" dt="2024-04-19T00:45:46.953" v="27"/>
+          <ac:cxnSpMkLst>
+            <pc:docMk/>
+            <pc:sldMk cId="1677787951" sldId="307"/>
+            <ac:cxnSpMk id="14" creationId="{1585265B-4E00-434F-A644-ADFF1F48468A}"/>
+          </ac:cxnSpMkLst>
+        </pc:cxnChg>
+        <pc:cxnChg chg="del">
+          <ac:chgData name="PEREZ VERGARA MELANY" userId="S::m.perezvergara@uandresbello.edu::d95698a7-632e-4c03-ab0f-564477513d69" providerId="AD" clId="Web-{512BB393-AFC8-321A-CA6F-0FE68B77EE34}" dt="2024-04-19T00:45:48.312" v="28"/>
+          <ac:cxnSpMkLst>
+            <pc:docMk/>
+            <pc:sldMk cId="1677787951" sldId="307"/>
+            <ac:cxnSpMk id="15" creationId="{5B64C4A8-E34F-4E93-9BA1-1925F378EC3D}"/>
+          </ac:cxnSpMkLst>
+        </pc:cxnChg>
+        <pc:cxnChg chg="del">
+          <ac:chgData name="PEREZ VERGARA MELANY" userId="S::m.perezvergara@uandresbello.edu::d95698a7-632e-4c03-ab0f-564477513d69" providerId="AD" clId="Web-{512BB393-AFC8-321A-CA6F-0FE68B77EE34}" dt="2024-04-19T00:46:09.126" v="36"/>
+          <ac:cxnSpMkLst>
+            <pc:docMk/>
+            <pc:sldMk cId="1677787951" sldId="307"/>
+            <ac:cxnSpMk id="16" creationId="{122064AE-3A3A-4F63-800C-6648A2ADA6BE}"/>
+          </ac:cxnSpMkLst>
+        </pc:cxnChg>
+        <pc:cxnChg chg="del">
+          <ac:chgData name="PEREZ VERGARA MELANY" userId="S::m.perezvergara@uandresbello.edu::d95698a7-632e-4c03-ab0f-564477513d69" providerId="AD" clId="Web-{512BB393-AFC8-321A-CA6F-0FE68B77EE34}" dt="2024-04-19T00:46:05.079" v="34"/>
+          <ac:cxnSpMkLst>
+            <pc:docMk/>
+            <pc:sldMk cId="1677787951" sldId="307"/>
+            <ac:cxnSpMk id="18" creationId="{6B53EC84-3601-4293-B749-A2BC2795B17D}"/>
+          </ac:cxnSpMkLst>
+        </pc:cxnChg>
+        <pc:cxnChg chg="del mod">
+          <ac:chgData name="PEREZ VERGARA MELANY" userId="S::m.perezvergara@uandresbello.edu::d95698a7-632e-4c03-ab0f-564477513d69" providerId="AD" clId="Web-{512BB393-AFC8-321A-CA6F-0FE68B77EE34}" dt="2024-04-19T00:46:03.391" v="33"/>
+          <ac:cxnSpMkLst>
+            <pc:docMk/>
+            <pc:sldMk cId="1677787951" sldId="307"/>
+            <ac:cxnSpMk id="22" creationId="{6A7DB234-E311-4E3B-AE05-EF5CB163CB48}"/>
+          </ac:cxnSpMkLst>
+        </pc:cxnChg>
+      </pc:sldChg>
+      <pc:sldChg chg="modSp add replId">
+        <pc:chgData name="PEREZ VERGARA MELANY" userId="S::m.perezvergara@uandresbello.edu::d95698a7-632e-4c03-ab0f-564477513d69" providerId="AD" clId="Web-{512BB393-AFC8-321A-CA6F-0FE68B77EE34}" dt="2024-04-19T01:08:57.684" v="281" actId="20577"/>
+        <pc:sldMkLst>
+          <pc:docMk/>
+          <pc:sldMk cId="1128333449" sldId="312"/>
+        </pc:sldMkLst>
+        <pc:spChg chg="mod">
+          <ac:chgData name="PEREZ VERGARA MELANY" userId="S::m.perezvergara@uandresbello.edu::d95698a7-632e-4c03-ab0f-564477513d69" providerId="AD" clId="Web-{512BB393-AFC8-321A-CA6F-0FE68B77EE34}" dt="2024-04-19T01:08:57.684" v="281" actId="20577"/>
+          <ac:spMkLst>
+            <pc:docMk/>
+            <pc:sldMk cId="1128333449" sldId="312"/>
+            <ac:spMk id="8" creationId="{8E5AB793-981F-4F0C-993F-B574912D895B}"/>
+          </ac:spMkLst>
+        </pc:spChg>
+      </pc:sldChg>
+      <pc:sldChg chg="addSp delSp modSp add replId">
+        <pc:chgData name="PEREZ VERGARA MELANY" userId="S::m.perezvergara@uandresbello.edu::d95698a7-632e-4c03-ab0f-564477513d69" providerId="AD" clId="Web-{512BB393-AFC8-321A-CA6F-0FE68B77EE34}" dt="2024-04-19T01:46:43.063" v="740" actId="20577"/>
+        <pc:sldMkLst>
+          <pc:docMk/>
+          <pc:sldMk cId="319540435" sldId="313"/>
+        </pc:sldMkLst>
+        <pc:spChg chg="del">
+          <ac:chgData name="PEREZ VERGARA MELANY" userId="S::m.perezvergara@uandresbello.edu::d95698a7-632e-4c03-ab0f-564477513d69" providerId="AD" clId="Web-{512BB393-AFC8-321A-CA6F-0FE68B77EE34}" dt="2024-04-19T01:10:09.204" v="297"/>
+          <ac:spMkLst>
+            <pc:docMk/>
+            <pc:sldMk cId="319540435" sldId="313"/>
+            <ac:spMk id="2" creationId="{89F7B28D-E55B-A156-E75F-6B7FAAC53BF2}"/>
+          </ac:spMkLst>
+        </pc:spChg>
+        <pc:spChg chg="del">
+          <ac:chgData name="PEREZ VERGARA MELANY" userId="S::m.perezvergara@uandresbello.edu::d95698a7-632e-4c03-ab0f-564477513d69" providerId="AD" clId="Web-{512BB393-AFC8-321A-CA6F-0FE68B77EE34}" dt="2024-04-19T01:09:45.843" v="283"/>
+          <ac:spMkLst>
+            <pc:docMk/>
+            <pc:sldMk cId="319540435" sldId="313"/>
+            <ac:spMk id="3" creationId="{D475482D-7F09-DE4F-FF9A-2C7FBEF94594}"/>
+          </ac:spMkLst>
+        </pc:spChg>
+        <pc:spChg chg="add mod">
+          <ac:chgData name="PEREZ VERGARA MELANY" userId="S::m.perezvergara@uandresbello.edu::d95698a7-632e-4c03-ab0f-564477513d69" providerId="AD" clId="Web-{512BB393-AFC8-321A-CA6F-0FE68B77EE34}" dt="2024-04-19T01:38:23.076" v="709" actId="1076"/>
+          <ac:spMkLst>
+            <pc:docMk/>
+            <pc:sldMk cId="319540435" sldId="313"/>
+            <ac:spMk id="4" creationId="{631823CF-BC2F-D4EC-5405-A6FDF562CE09}"/>
+          </ac:spMkLst>
+        </pc:spChg>
+        <pc:spChg chg="del mod">
+          <ac:chgData name="PEREZ VERGARA MELANY" userId="S::m.perezvergara@uandresbello.edu::d95698a7-632e-4c03-ab0f-564477513d69" providerId="AD" clId="Web-{512BB393-AFC8-321A-CA6F-0FE68B77EE34}" dt="2024-04-19T01:10:15.079" v="300"/>
+          <ac:spMkLst>
+            <pc:docMk/>
+            <pc:sldMk cId="319540435" sldId="313"/>
+            <ac:spMk id="5" creationId="{699E2788-EBE2-45DF-9C0B-D666080A46A9}"/>
+          </ac:spMkLst>
+        </pc:spChg>
+        <pc:spChg chg="del mod">
+          <ac:chgData name="PEREZ VERGARA MELANY" userId="S::m.perezvergara@uandresbello.edu::d95698a7-632e-4c03-ab0f-564477513d69" providerId="AD" clId="Web-{512BB393-AFC8-321A-CA6F-0FE68B77EE34}" dt="2024-04-19T01:10:05.188" v="295"/>
+          <ac:spMkLst>
+            <pc:docMk/>
+            <pc:sldMk cId="319540435" sldId="313"/>
+            <ac:spMk id="6" creationId="{9DEC9D77-6AA7-4B6B-881C-F31DAAE1DB2A}"/>
+          </ac:spMkLst>
+        </pc:spChg>
+        <pc:spChg chg="del">
+          <ac:chgData name="PEREZ VERGARA MELANY" userId="S::m.perezvergara@uandresbello.edu::d95698a7-632e-4c03-ab0f-564477513d69" providerId="AD" clId="Web-{512BB393-AFC8-321A-CA6F-0FE68B77EE34}" dt="2024-04-19T01:10:32.861" v="311"/>
+          <ac:spMkLst>
+            <pc:docMk/>
+            <pc:sldMk cId="319540435" sldId="313"/>
+            <ac:spMk id="8" creationId="{8E5AB793-981F-4F0C-993F-B574912D895B}"/>
+          </ac:spMkLst>
+        </pc:spChg>
+        <pc:spChg chg="del">
+          <ac:chgData name="PEREZ VERGARA MELANY" userId="S::m.perezvergara@uandresbello.edu::d95698a7-632e-4c03-ab0f-564477513d69" providerId="AD" clId="Web-{512BB393-AFC8-321A-CA6F-0FE68B77EE34}" dt="2024-04-19T01:09:54.968" v="286"/>
+          <ac:spMkLst>
+            <pc:docMk/>
+            <pc:sldMk cId="319540435" sldId="313"/>
+            <ac:spMk id="10" creationId="{DC1D303F-E600-4ACE-9AB7-C6AEB05050D4}"/>
+          </ac:spMkLst>
+        </pc:spChg>
+        <pc:spChg chg="del mod">
+          <ac:chgData name="PEREZ VERGARA MELANY" userId="S::m.perezvergara@uandresbello.edu::d95698a7-632e-4c03-ab0f-564477513d69" providerId="AD" clId="Web-{512BB393-AFC8-321A-CA6F-0FE68B77EE34}" dt="2024-04-19T01:10:07.110" v="296"/>
+          <ac:spMkLst>
+            <pc:docMk/>
+            <pc:sldMk cId="319540435" sldId="313"/>
+            <ac:spMk id="11" creationId="{ACB6F962-DADC-4482-8A69-766A19968AF5}"/>
+          </ac:spMkLst>
+        </pc:spChg>
+        <pc:spChg chg="mod">
+          <ac:chgData name="PEREZ VERGARA MELANY" userId="S::m.perezvergara@uandresbello.edu::d95698a7-632e-4c03-ab0f-564477513d69" providerId="AD" clId="Web-{512BB393-AFC8-321A-CA6F-0FE68B77EE34}" dt="2024-04-19T01:10:51.190" v="326" actId="20577"/>
+          <ac:spMkLst>
+            <pc:docMk/>
+            <pc:sldMk cId="319540435" sldId="313"/>
+            <ac:spMk id="12" creationId="{A3A365B2-B2DE-4D2C-92CE-32C0611969DB}"/>
+          </ac:spMkLst>
+        </pc:spChg>
+        <pc:spChg chg="add mod">
+          <ac:chgData name="PEREZ VERGARA MELANY" userId="S::m.perezvergara@uandresbello.edu::d95698a7-632e-4c03-ab0f-564477513d69" providerId="AD" clId="Web-{512BB393-AFC8-321A-CA6F-0FE68B77EE34}" dt="2024-04-19T01:30:03.830" v="483" actId="20577"/>
+          <ac:spMkLst>
+            <pc:docMk/>
+            <pc:sldMk cId="319540435" sldId="313"/>
+            <ac:spMk id="17" creationId="{1FCC3FBF-86B2-0BB3-B8FA-409661665625}"/>
+          </ac:spMkLst>
+        </pc:spChg>
+        <pc:spChg chg="del">
+          <ac:chgData name="PEREZ VERGARA MELANY" userId="S::m.perezvergara@uandresbello.edu::d95698a7-632e-4c03-ab0f-564477513d69" providerId="AD" clId="Web-{512BB393-AFC8-321A-CA6F-0FE68B77EE34}" dt="2024-04-19T01:10:25.048" v="307"/>
+          <ac:spMkLst>
+            <pc:docMk/>
+            <pc:sldMk cId="319540435" sldId="313"/>
+            <ac:spMk id="19" creationId="{9052CB31-5E86-43F7-9E18-68D97336D3DC}"/>
+          </ac:spMkLst>
+        </pc:spChg>
+        <pc:spChg chg="del">
+          <ac:chgData name="PEREZ VERGARA MELANY" userId="S::m.perezvergara@uandresbello.edu::d95698a7-632e-4c03-ab0f-564477513d69" providerId="AD" clId="Web-{512BB393-AFC8-321A-CA6F-0FE68B77EE34}" dt="2024-04-19T01:10:30.642" v="310"/>
+          <ac:spMkLst>
+            <pc:docMk/>
+            <pc:sldMk cId="319540435" sldId="313"/>
+            <ac:spMk id="20" creationId="{BF49D49A-95BF-4D21-AE29-BD9D704FEC5F}"/>
+          </ac:spMkLst>
+        </pc:spChg>
+        <pc:spChg chg="del">
+          <ac:chgData name="PEREZ VERGARA MELANY" userId="S::m.perezvergara@uandresbello.edu::d95698a7-632e-4c03-ab0f-564477513d69" providerId="AD" clId="Web-{512BB393-AFC8-321A-CA6F-0FE68B77EE34}" dt="2024-04-19T01:09:57.687" v="290"/>
+          <ac:spMkLst>
+            <pc:docMk/>
+            <pc:sldMk cId="319540435" sldId="313"/>
+            <ac:spMk id="21" creationId="{6A548F58-8CF8-4D0C-8871-44C1700A4D4B}"/>
+          </ac:spMkLst>
+        </pc:spChg>
+        <pc:spChg chg="add del mod">
+          <ac:chgData name="PEREZ VERGARA MELANY" userId="S::m.perezvergara@uandresbello.edu::d95698a7-632e-4c03-ab0f-564477513d69" providerId="AD" clId="Web-{512BB393-AFC8-321A-CA6F-0FE68B77EE34}" dt="2024-04-19T01:38:28.873" v="711" actId="1076"/>
+          <ac:spMkLst>
+            <pc:docMk/>
+            <pc:sldMk cId="319540435" sldId="313"/>
+            <ac:spMk id="23" creationId="{73182A38-D6DF-453D-921E-315EFA20E2ED}"/>
+          </ac:spMkLst>
+        </pc:spChg>
+        <pc:spChg chg="add mod">
+          <ac:chgData name="PEREZ VERGARA MELANY" userId="S::m.perezvergara@uandresbello.edu::d95698a7-632e-4c03-ab0f-564477513d69" providerId="AD" clId="Web-{512BB393-AFC8-321A-CA6F-0FE68B77EE34}" dt="2024-04-19T01:46:43.063" v="740" actId="20577"/>
+          <ac:spMkLst>
+            <pc:docMk/>
+            <pc:sldMk cId="319540435" sldId="313"/>
+            <ac:spMk id="24" creationId="{BA18F6DF-CBB0-C049-F795-5FBA7BFF080B}"/>
+          </ac:spMkLst>
+        </pc:spChg>
+        <pc:picChg chg="del">
+          <ac:chgData name="PEREZ VERGARA MELANY" userId="S::m.perezvergara@uandresbello.edu::d95698a7-632e-4c03-ab0f-564477513d69" providerId="AD" clId="Web-{512BB393-AFC8-321A-CA6F-0FE68B77EE34}" dt="2024-04-19T01:09:55.625" v="287"/>
+          <ac:picMkLst>
+            <pc:docMk/>
+            <pc:sldMk cId="319540435" sldId="313"/>
+            <ac:picMk id="9" creationId="{8CA17F75-6E6A-44AC-B88D-4A56682EC3B2}"/>
+          </ac:picMkLst>
+        </pc:picChg>
+        <pc:picChg chg="del">
+          <ac:chgData name="PEREZ VERGARA MELANY" userId="S::m.perezvergara@uandresbello.edu::d95698a7-632e-4c03-ab0f-564477513d69" providerId="AD" clId="Web-{512BB393-AFC8-321A-CA6F-0FE68B77EE34}" dt="2024-04-19T01:10:16.954" v="301"/>
+          <ac:picMkLst>
+            <pc:docMk/>
+            <pc:sldMk cId="319540435" sldId="313"/>
+            <ac:picMk id="13" creationId="{0B2A21D9-80B6-456C-A8D6-7AE3F3558AF4}"/>
+          </ac:picMkLst>
+        </pc:picChg>
+        <pc:cxnChg chg="del">
+          <ac:chgData name="PEREZ VERGARA MELANY" userId="S::m.perezvergara@uandresbello.edu::d95698a7-632e-4c03-ab0f-564477513d69" providerId="AD" clId="Web-{512BB393-AFC8-321A-CA6F-0FE68B77EE34}" dt="2024-04-19T01:10:19.642" v="303"/>
+          <ac:cxnSpMkLst>
+            <pc:docMk/>
+            <pc:sldMk cId="319540435" sldId="313"/>
+            <ac:cxnSpMk id="14" creationId="{1585265B-4E00-434F-A644-ADFF1F48468A}"/>
+          </ac:cxnSpMkLst>
+        </pc:cxnChg>
+        <pc:cxnChg chg="del">
+          <ac:chgData name="PEREZ VERGARA MELANY" userId="S::m.perezvergara@uandresbello.edu::d95698a7-632e-4c03-ab0f-564477513d69" providerId="AD" clId="Web-{512BB393-AFC8-321A-CA6F-0FE68B77EE34}" dt="2024-04-19T01:10:21.048" v="304"/>
+          <ac:cxnSpMkLst>
+            <pc:docMk/>
+            <pc:sldMk cId="319540435" sldId="313"/>
+            <ac:cxnSpMk id="15" creationId="{5B64C4A8-E34F-4E93-9BA1-1925F378EC3D}"/>
+          </ac:cxnSpMkLst>
+        </pc:cxnChg>
+        <pc:cxnChg chg="del">
+          <ac:chgData name="PEREZ VERGARA MELANY" userId="S::m.perezvergara@uandresbello.edu::d95698a7-632e-4c03-ab0f-564477513d69" providerId="AD" clId="Web-{512BB393-AFC8-321A-CA6F-0FE68B77EE34}" dt="2024-04-19T01:10:27.611" v="308"/>
+          <ac:cxnSpMkLst>
+            <pc:docMk/>
+            <pc:sldMk cId="319540435" sldId="313"/>
+            <ac:cxnSpMk id="16" creationId="{122064AE-3A3A-4F63-800C-6648A2ADA6BE}"/>
+          </ac:cxnSpMkLst>
+        </pc:cxnChg>
+        <pc:cxnChg chg="del">
+          <ac:chgData name="PEREZ VERGARA MELANY" userId="S::m.perezvergara@uandresbello.edu::d95698a7-632e-4c03-ab0f-564477513d69" providerId="AD" clId="Web-{512BB393-AFC8-321A-CA6F-0FE68B77EE34}" dt="2024-04-19T01:10:29.095" v="309"/>
+          <ac:cxnSpMkLst>
+            <pc:docMk/>
+            <pc:sldMk cId="319540435" sldId="313"/>
+            <ac:cxnSpMk id="18" creationId="{6B53EC84-3601-4293-B749-A2BC2795B17D}"/>
+          </ac:cxnSpMkLst>
+        </pc:cxnChg>
+        <pc:cxnChg chg="del mod">
+          <ac:chgData name="PEREZ VERGARA MELANY" userId="S::m.perezvergara@uandresbello.edu::d95698a7-632e-4c03-ab0f-564477513d69" providerId="AD" clId="Web-{512BB393-AFC8-321A-CA6F-0FE68B77EE34}" dt="2024-04-19T01:10:18.095" v="302"/>
+          <ac:cxnSpMkLst>
+            <pc:docMk/>
+            <pc:sldMk cId="319540435" sldId="313"/>
+            <ac:cxnSpMk id="22" creationId="{6A7DB234-E311-4E3B-AE05-EF5CB163CB48}"/>
+          </ac:cxnSpMkLst>
+        </pc:cxnChg>
       </pc:sldChg>
     </pc:docChg>
   </pc:docChgLst>
@@ -2512,6 +2507,52 @@
             <ac:cxnSpMk id="69" creationId="{0782B690-90D6-40DE-996D-12D256D4917E}"/>
           </ac:cxnSpMkLst>
         </pc:cxnChg>
+      </pc:sldChg>
+    </pc:docChg>
+  </pc:docChgLst>
+  <pc:docChgLst>
+    <pc:chgData name="PEREZ VERGARA MELANY" userId="S::m.perezvergara@uandresbello.edu::d95698a7-632e-4c03-ab0f-564477513d69" providerId="AD" clId="Web-{C1D83132-9614-F8F2-79FB-6DF641706D93}"/>
+    <pc:docChg chg="delSld modSld">
+      <pc:chgData name="PEREZ VERGARA MELANY" userId="S::m.perezvergara@uandresbello.edu::d95698a7-632e-4c03-ab0f-564477513d69" providerId="AD" clId="Web-{C1D83132-9614-F8F2-79FB-6DF641706D93}" dt="2024-05-26T21:04:56.468" v="5"/>
+      <pc:docMkLst>
+        <pc:docMk/>
+      </pc:docMkLst>
+      <pc:sldChg chg="modSp">
+        <pc:chgData name="PEREZ VERGARA MELANY" userId="S::m.perezvergara@uandresbello.edu::d95698a7-632e-4c03-ab0f-564477513d69" providerId="AD" clId="Web-{C1D83132-9614-F8F2-79FB-6DF641706D93}" dt="2024-05-26T21:00:09.283" v="1" actId="1076"/>
+        <pc:sldMkLst>
+          <pc:docMk/>
+          <pc:sldMk cId="4002806811" sldId="305"/>
+        </pc:sldMkLst>
+        <pc:spChg chg="mod">
+          <ac:chgData name="PEREZ VERGARA MELANY" userId="S::m.perezvergara@uandresbello.edu::d95698a7-632e-4c03-ab0f-564477513d69" providerId="AD" clId="Web-{C1D83132-9614-F8F2-79FB-6DF641706D93}" dt="2024-05-26T21:00:09.283" v="1" actId="1076"/>
+          <ac:spMkLst>
+            <pc:docMk/>
+            <pc:sldMk cId="4002806811" sldId="305"/>
+            <ac:spMk id="78" creationId="{01A187E2-50D2-4CF9-BEC4-99ED7D9D1517}"/>
+          </ac:spMkLst>
+        </pc:spChg>
+      </pc:sldChg>
+      <pc:sldChg chg="addSp delSp modSp">
+        <pc:chgData name="PEREZ VERGARA MELANY" userId="S::m.perezvergara@uandresbello.edu::d95698a7-632e-4c03-ab0f-564477513d69" providerId="AD" clId="Web-{C1D83132-9614-F8F2-79FB-6DF641706D93}" dt="2024-05-26T21:03:41.730" v="4"/>
+        <pc:sldMkLst>
+          <pc:docMk/>
+          <pc:sldMk cId="2174621688" sldId="317"/>
+        </pc:sldMkLst>
+        <pc:spChg chg="add del mod">
+          <ac:chgData name="PEREZ VERGARA MELANY" userId="S::m.perezvergara@uandresbello.edu::d95698a7-632e-4c03-ab0f-564477513d69" providerId="AD" clId="Web-{C1D83132-9614-F8F2-79FB-6DF641706D93}" dt="2024-05-26T21:03:41.730" v="4"/>
+          <ac:spMkLst>
+            <pc:docMk/>
+            <pc:sldMk cId="2174621688" sldId="317"/>
+            <ac:spMk id="3" creationId="{F469EB2E-2126-2775-E635-DA88195FFA7B}"/>
+          </ac:spMkLst>
+        </pc:spChg>
+      </pc:sldChg>
+      <pc:sldChg chg="del">
+        <pc:chgData name="PEREZ VERGARA MELANY" userId="S::m.perezvergara@uandresbello.edu::d95698a7-632e-4c03-ab0f-564477513d69" providerId="AD" clId="Web-{C1D83132-9614-F8F2-79FB-6DF641706D93}" dt="2024-05-26T21:04:56.468" v="5"/>
+        <pc:sldMkLst>
+          <pc:docMk/>
+          <pc:sldMk cId="2948978149" sldId="323"/>
+        </pc:sldMkLst>
       </pc:sldChg>
     </pc:docChg>
   </pc:docChgLst>
@@ -10075,7 +10116,7 @@
           <a:p>
             <a:fld id="{89347D60-E39B-E041-B6CE-3FDC1A8BB989}" type="datetimeFigureOut">
               <a:rPr lang="es-ES_tradnl" smtClean="0"/>
-              <a:t>20/04/2024</a:t>
+              <a:t>26/05/2024</a:t>
             </a:fld>
             <a:endParaRPr lang="es-ES_tradnl"/>
           </a:p>
@@ -11163,7 +11204,7 @@
           <a:p>
             <a:fld id="{80AD1966-643A-ED45-BFF9-B0FE18A32E2B}" type="slidenum">
               <a:rPr lang="es-ES_tradnl" smtClean="0"/>
-              <a:t>19</a:t>
+              <a:t>20</a:t>
             </a:fld>
             <a:endParaRPr lang="es-ES_tradnl"/>
           </a:p>
@@ -11172,7 +11213,7 @@
     </p:spTree>
     <p:extLst>
       <p:ext uri="{BB962C8B-B14F-4D97-AF65-F5344CB8AC3E}">
-        <p14:creationId xmlns:p14="http://schemas.microsoft.com/office/powerpoint/2010/main" val="1784406171"/>
+        <p14:creationId xmlns:p14="http://schemas.microsoft.com/office/powerpoint/2010/main" val="2756993521"/>
       </p:ext>
     </p:extLst>
   </p:cSld>
@@ -11247,7 +11288,7 @@
           <a:p>
             <a:fld id="{80AD1966-643A-ED45-BFF9-B0FE18A32E2B}" type="slidenum">
               <a:rPr lang="es-ES_tradnl" smtClean="0"/>
-              <a:t>20</a:t>
+              <a:t>21</a:t>
             </a:fld>
             <a:endParaRPr lang="es-ES_tradnl"/>
           </a:p>
@@ -11256,7 +11297,7 @@
     </p:spTree>
     <p:extLst>
       <p:ext uri="{BB962C8B-B14F-4D97-AF65-F5344CB8AC3E}">
-        <p14:creationId xmlns:p14="http://schemas.microsoft.com/office/powerpoint/2010/main" val="2756993521"/>
+        <p14:creationId xmlns:p14="http://schemas.microsoft.com/office/powerpoint/2010/main" val="249151720"/>
       </p:ext>
     </p:extLst>
   </p:cSld>
@@ -11351,90 +11392,6 @@
 </file>
 
 <file path=ppt/notesSlides/notesSlide20.xml><?xml version="1.0" encoding="utf-8"?>
-<p:notes xmlns:a="http://schemas.openxmlformats.org/drawingml/2006/main" xmlns:r="http://schemas.openxmlformats.org/officeDocument/2006/relationships" xmlns:p="http://schemas.openxmlformats.org/presentationml/2006/main">
-  <p:cSld>
-    <p:spTree>
-      <p:nvGrpSpPr>
-        <p:cNvPr id="1" name=""/>
-        <p:cNvGrpSpPr/>
-        <p:nvPr/>
-      </p:nvGrpSpPr>
-      <p:grpSpPr>
-        <a:xfrm>
-          <a:off x="0" y="0"/>
-          <a:ext cx="0" cy="0"/>
-          <a:chOff x="0" y="0"/>
-          <a:chExt cx="0" cy="0"/>
-        </a:xfrm>
-      </p:grpSpPr>
-      <p:sp>
-        <p:nvSpPr>
-          <p:cNvPr id="2" name="Marcador de imagen de diapositiva 1"/>
-          <p:cNvSpPr>
-            <a:spLocks noGrp="1" noRot="1" noChangeAspect="1"/>
-          </p:cNvSpPr>
-          <p:nvPr>
-            <p:ph type="sldImg"/>
-          </p:nvPr>
-        </p:nvSpPr>
-        <p:spPr/>
-      </p:sp>
-      <p:sp>
-        <p:nvSpPr>
-          <p:cNvPr id="3" name="Marcador de notas 2"/>
-          <p:cNvSpPr>
-            <a:spLocks noGrp="1"/>
-          </p:cNvSpPr>
-          <p:nvPr>
-            <p:ph type="body" idx="1"/>
-          </p:nvPr>
-        </p:nvSpPr>
-        <p:spPr/>
-        <p:txBody>
-          <a:bodyPr/>
-          <a:lstStyle/>
-          <a:p>
-            <a:endParaRPr lang="es-ES_tradnl"/>
-          </a:p>
-        </p:txBody>
-      </p:sp>
-      <p:sp>
-        <p:nvSpPr>
-          <p:cNvPr id="4" name="Marcador de número de diapositiva 3"/>
-          <p:cNvSpPr>
-            <a:spLocks noGrp="1"/>
-          </p:cNvSpPr>
-          <p:nvPr>
-            <p:ph type="sldNum" sz="quarter" idx="10"/>
-          </p:nvPr>
-        </p:nvSpPr>
-        <p:spPr/>
-        <p:txBody>
-          <a:bodyPr/>
-          <a:lstStyle/>
-          <a:p>
-            <a:fld id="{80AD1966-643A-ED45-BFF9-B0FE18A32E2B}" type="slidenum">
-              <a:rPr lang="es-ES_tradnl" smtClean="0"/>
-              <a:t>21</a:t>
-            </a:fld>
-            <a:endParaRPr lang="es-ES_tradnl"/>
-          </a:p>
-        </p:txBody>
-      </p:sp>
-    </p:spTree>
-    <p:extLst>
-      <p:ext uri="{BB962C8B-B14F-4D97-AF65-F5344CB8AC3E}">
-        <p14:creationId xmlns:p14="http://schemas.microsoft.com/office/powerpoint/2010/main" val="249151720"/>
-      </p:ext>
-    </p:extLst>
-  </p:cSld>
-  <p:clrMapOvr>
-    <a:masterClrMapping/>
-  </p:clrMapOvr>
-</p:notes>
-</file>
-
-<file path=ppt/notesSlides/notesSlide21.xml><?xml version="1.0" encoding="utf-8"?>
 <p:notes xmlns:a="http://schemas.openxmlformats.org/drawingml/2006/main" xmlns:r="http://schemas.openxmlformats.org/officeDocument/2006/relationships" xmlns:p="http://schemas.openxmlformats.org/presentationml/2006/main">
   <p:cSld>
     <p:spTree>
@@ -12243,7 +12200,7 @@
           <a:p>
             <a:fld id="{6FD36221-589F-2846-B89B-D09559D774BF}" type="datetimeFigureOut">
               <a:rPr lang="es-ES_tradnl" smtClean="0"/>
-              <a:t>20/04/2024</a:t>
+              <a:t>26/05/2024</a:t>
             </a:fld>
             <a:endParaRPr lang="es-ES_tradnl"/>
           </a:p>
@@ -12408,7 +12365,7 @@
           <a:p>
             <a:fld id="{6FD36221-589F-2846-B89B-D09559D774BF}" type="datetimeFigureOut">
               <a:rPr lang="es-ES_tradnl" smtClean="0"/>
-              <a:t>20/04/2024</a:t>
+              <a:t>26/05/2024</a:t>
             </a:fld>
             <a:endParaRPr lang="es-ES_tradnl"/>
           </a:p>
@@ -12583,7 +12540,7 @@
           <a:p>
             <a:fld id="{6FD36221-589F-2846-B89B-D09559D774BF}" type="datetimeFigureOut">
               <a:rPr lang="es-ES_tradnl" smtClean="0"/>
-              <a:t>20/04/2024</a:t>
+              <a:t>26/05/2024</a:t>
             </a:fld>
             <a:endParaRPr lang="es-ES_tradnl"/>
           </a:p>
@@ -12748,7 +12705,7 @@
           <a:p>
             <a:fld id="{6FD36221-589F-2846-B89B-D09559D774BF}" type="datetimeFigureOut">
               <a:rPr lang="es-ES_tradnl" smtClean="0"/>
-              <a:t>20/04/2024</a:t>
+              <a:t>26/05/2024</a:t>
             </a:fld>
             <a:endParaRPr lang="es-ES_tradnl"/>
           </a:p>
@@ -12987,7 +12944,7 @@
           <a:p>
             <a:fld id="{6FD36221-589F-2846-B89B-D09559D774BF}" type="datetimeFigureOut">
               <a:rPr lang="es-ES_tradnl" smtClean="0"/>
-              <a:t>20/04/2024</a:t>
+              <a:t>26/05/2024</a:t>
             </a:fld>
             <a:endParaRPr lang="es-ES_tradnl"/>
           </a:p>
@@ -13214,7 +13171,7 @@
           <a:p>
             <a:fld id="{6FD36221-589F-2846-B89B-D09559D774BF}" type="datetimeFigureOut">
               <a:rPr lang="es-ES_tradnl" smtClean="0"/>
-              <a:t>20/04/2024</a:t>
+              <a:t>26/05/2024</a:t>
             </a:fld>
             <a:endParaRPr lang="es-ES_tradnl"/>
           </a:p>
@@ -13576,7 +13533,7 @@
           <a:p>
             <a:fld id="{6FD36221-589F-2846-B89B-D09559D774BF}" type="datetimeFigureOut">
               <a:rPr lang="es-ES_tradnl" smtClean="0"/>
-              <a:t>20/04/2024</a:t>
+              <a:t>26/05/2024</a:t>
             </a:fld>
             <a:endParaRPr lang="es-ES_tradnl"/>
           </a:p>
@@ -13689,7 +13646,7 @@
           <a:p>
             <a:fld id="{6FD36221-589F-2846-B89B-D09559D774BF}" type="datetimeFigureOut">
               <a:rPr lang="es-ES_tradnl" smtClean="0"/>
-              <a:t>20/04/2024</a:t>
+              <a:t>26/05/2024</a:t>
             </a:fld>
             <a:endParaRPr lang="es-ES_tradnl"/>
           </a:p>
@@ -13779,7 +13736,7 @@
           <a:p>
             <a:fld id="{6FD36221-589F-2846-B89B-D09559D774BF}" type="datetimeFigureOut">
               <a:rPr lang="es-ES_tradnl" smtClean="0"/>
-              <a:t>20/04/2024</a:t>
+              <a:t>26/05/2024</a:t>
             </a:fld>
             <a:endParaRPr lang="es-ES_tradnl"/>
           </a:p>
@@ -14051,7 +14008,7 @@
           <a:p>
             <a:fld id="{6FD36221-589F-2846-B89B-D09559D774BF}" type="datetimeFigureOut">
               <a:rPr lang="es-ES_tradnl" smtClean="0"/>
-              <a:t>20/04/2024</a:t>
+              <a:t>26/05/2024</a:t>
             </a:fld>
             <a:endParaRPr lang="es-ES_tradnl"/>
           </a:p>
@@ -14303,7 +14260,7 @@
           <a:p>
             <a:fld id="{6FD36221-589F-2846-B89B-D09559D774BF}" type="datetimeFigureOut">
               <a:rPr lang="es-ES_tradnl" smtClean="0"/>
-              <a:t>20/04/2024</a:t>
+              <a:t>26/05/2024</a:t>
             </a:fld>
             <a:endParaRPr lang="es-ES_tradnl"/>
           </a:p>
@@ -14511,7 +14468,7 @@
           <a:p>
             <a:fld id="{6FD36221-589F-2846-B89B-D09559D774BF}" type="datetimeFigureOut">
               <a:rPr lang="es-ES_tradnl" smtClean="0"/>
-              <a:t>20/04/2024</a:t>
+              <a:t>26/05/2024</a:t>
             </a:fld>
             <a:endParaRPr lang="es-ES_tradnl"/>
           </a:p>
@@ -23938,10 +23895,203 @@
       </p:sp>
       <p:sp>
         <p:nvSpPr>
-          <p:cNvPr id="8" name="Marcador de contenido 2">
+          <p:cNvPr id="12" name="CuadroTexto 11">
             <a:extLst>
               <a:ext uri="{FF2B5EF4-FFF2-40B4-BE49-F238E27FC236}">
-                <a16:creationId xmlns:a16="http://schemas.microsoft.com/office/drawing/2014/main" id="{8E5AB793-981F-4F0C-993F-B574912D895B}"/>
+                <a16:creationId xmlns:a16="http://schemas.microsoft.com/office/drawing/2014/main" id="{A3A365B2-B2DE-4D2C-92CE-32C0611969DB}"/>
+              </a:ext>
+            </a:extLst>
+          </p:cNvPr>
+          <p:cNvSpPr txBox="1"/>
+          <p:nvPr/>
+        </p:nvSpPr>
+        <p:spPr>
+          <a:xfrm>
+            <a:off x="3360366" y="457769"/>
+            <a:ext cx="2423849" cy="461665"/>
+          </a:xfrm>
+          <a:prstGeom prst="rect">
+            <a:avLst/>
+          </a:prstGeom>
+          <a:noFill/>
+        </p:spPr>
+        <p:txBody>
+          <a:bodyPr wrap="square" lIns="91440" tIns="45720" rIns="91440" bIns="45720" anchor="t">
+            <a:spAutoFit/>
+          </a:bodyPr>
+          <a:lstStyle/>
+          <a:p>
+            <a:pPr algn="ctr"/>
+            <a:r>
+              <a:rPr lang="es-ES" sz="2400" b="1">
+                <a:solidFill>
+                  <a:schemeClr val="bg1"/>
+                </a:solidFill>
+                <a:latin typeface="Arial"/>
+                <a:cs typeface="Arial"/>
+              </a:rPr>
+              <a:t>Conclusiones</a:t>
+            </a:r>
+            <a:endParaRPr lang="en-US" sz="2400"/>
+          </a:p>
+        </p:txBody>
+      </p:sp>
+      <p:pic>
+        <p:nvPicPr>
+          <p:cNvPr id="2" name="Picture 1">
+            <a:extLst>
+              <a:ext uri="{FF2B5EF4-FFF2-40B4-BE49-F238E27FC236}">
+                <a16:creationId xmlns:a16="http://schemas.microsoft.com/office/drawing/2014/main" id="{23A4DE73-032F-5C86-32D4-47B88187D538}"/>
+              </a:ext>
+            </a:extLst>
+          </p:cNvPr>
+          <p:cNvPicPr>
+            <a:picLocks noChangeAspect="1"/>
+          </p:cNvPicPr>
+          <p:nvPr/>
+        </p:nvPicPr>
+        <p:blipFill>
+          <a:blip r:embed="rId3"/>
+          <a:stretch>
+            <a:fillRect/>
+          </a:stretch>
+        </p:blipFill>
+        <p:spPr>
+          <a:xfrm>
+            <a:off x="437701" y="3783222"/>
+            <a:ext cx="1511241" cy="2555217"/>
+          </a:xfrm>
+          <a:prstGeom prst="rect">
+            <a:avLst/>
+          </a:prstGeom>
+        </p:spPr>
+      </p:pic>
+      <p:pic>
+        <p:nvPicPr>
+          <p:cNvPr id="3" name="Picture 2" descr="A graph with orange bars&#10;&#10;Description automatically generated">
+            <a:extLst>
+              <a:ext uri="{FF2B5EF4-FFF2-40B4-BE49-F238E27FC236}">
+                <a16:creationId xmlns:a16="http://schemas.microsoft.com/office/drawing/2014/main" id="{640B9896-0E17-3368-F85A-5F53EC3992AC}"/>
+              </a:ext>
+            </a:extLst>
+          </p:cNvPr>
+          <p:cNvPicPr>
+            <a:picLocks noChangeAspect="1"/>
+          </p:cNvPicPr>
+          <p:nvPr/>
+        </p:nvPicPr>
+        <p:blipFill>
+          <a:blip r:embed="rId4"/>
+          <a:stretch>
+            <a:fillRect/>
+          </a:stretch>
+        </p:blipFill>
+        <p:spPr>
+          <a:xfrm>
+            <a:off x="2430043" y="3771452"/>
+            <a:ext cx="2141689" cy="2564382"/>
+          </a:xfrm>
+          <a:prstGeom prst="rect">
+            <a:avLst/>
+          </a:prstGeom>
+        </p:spPr>
+      </p:pic>
+      <p:pic>
+        <p:nvPicPr>
+          <p:cNvPr id="5" name="Picture 4" descr="A yellow rectangular object with white squares&#10;&#10;Description automatically generated">
+            <a:extLst>
+              <a:ext uri="{FF2B5EF4-FFF2-40B4-BE49-F238E27FC236}">
+                <a16:creationId xmlns:a16="http://schemas.microsoft.com/office/drawing/2014/main" id="{0929B4DC-0183-A67E-4063-7A9B6366CB8C}"/>
+              </a:ext>
+            </a:extLst>
+          </p:cNvPr>
+          <p:cNvPicPr>
+            <a:picLocks noChangeAspect="1"/>
+          </p:cNvPicPr>
+          <p:nvPr/>
+        </p:nvPicPr>
+        <p:blipFill>
+          <a:blip r:embed="rId5"/>
+          <a:stretch>
+            <a:fillRect/>
+          </a:stretch>
+        </p:blipFill>
+        <p:spPr>
+          <a:xfrm>
+            <a:off x="4934938" y="3717087"/>
+            <a:ext cx="524955" cy="2601224"/>
+          </a:xfrm>
+          <a:prstGeom prst="rect">
+            <a:avLst/>
+          </a:prstGeom>
+        </p:spPr>
+      </p:pic>
+      <p:pic>
+        <p:nvPicPr>
+          <p:cNvPr id="6" name="Picture 5" descr="A yellow rectangle with white border&#10;&#10;Description automatically generated">
+            <a:extLst>
+              <a:ext uri="{FF2B5EF4-FFF2-40B4-BE49-F238E27FC236}">
+                <a16:creationId xmlns:a16="http://schemas.microsoft.com/office/drawing/2014/main" id="{828B1B0B-830C-A59F-093E-ABC975932E43}"/>
+              </a:ext>
+            </a:extLst>
+          </p:cNvPr>
+          <p:cNvPicPr>
+            <a:picLocks noChangeAspect="1"/>
+          </p:cNvPicPr>
+          <p:nvPr/>
+        </p:nvPicPr>
+        <p:blipFill>
+          <a:blip r:embed="rId6"/>
+          <a:stretch>
+            <a:fillRect/>
+          </a:stretch>
+        </p:blipFill>
+        <p:spPr>
+          <a:xfrm>
+            <a:off x="5471214" y="5017968"/>
+            <a:ext cx="545082" cy="1322178"/>
+          </a:xfrm>
+          <a:prstGeom prst="rect">
+            <a:avLst/>
+          </a:prstGeom>
+        </p:spPr>
+      </p:pic>
+      <p:pic>
+        <p:nvPicPr>
+          <p:cNvPr id="7" name="Picture 6" descr="A red graph with numbers&#10;&#10;Description automatically generated">
+            <a:extLst>
+              <a:ext uri="{FF2B5EF4-FFF2-40B4-BE49-F238E27FC236}">
+                <a16:creationId xmlns:a16="http://schemas.microsoft.com/office/drawing/2014/main" id="{069A3D7C-E249-8072-81C8-C5317D249C66}"/>
+              </a:ext>
+            </a:extLst>
+          </p:cNvPr>
+          <p:cNvPicPr>
+            <a:picLocks noChangeAspect="1"/>
+          </p:cNvPicPr>
+          <p:nvPr/>
+        </p:nvPicPr>
+        <p:blipFill>
+          <a:blip r:embed="rId7"/>
+          <a:stretch>
+            <a:fillRect/>
+          </a:stretch>
+        </p:blipFill>
+        <p:spPr>
+          <a:xfrm>
+            <a:off x="6126821" y="3561901"/>
+            <a:ext cx="2598169" cy="2796577"/>
+          </a:xfrm>
+          <a:prstGeom prst="rect">
+            <a:avLst/>
+          </a:prstGeom>
+        </p:spPr>
+      </p:pic>
+      <p:sp>
+        <p:nvSpPr>
+          <p:cNvPr id="10" name="Marcador de contenido 2">
+            <a:extLst>
+              <a:ext uri="{FF2B5EF4-FFF2-40B4-BE49-F238E27FC236}">
+                <a16:creationId xmlns:a16="http://schemas.microsoft.com/office/drawing/2014/main" id="{022D82BC-67B0-4F5D-9A8F-C3B94B9A014B}"/>
               </a:ext>
             </a:extLst>
           </p:cNvPr>
@@ -23952,7 +24102,7 @@
         </p:nvSpPr>
         <p:spPr>
           <a:xfrm>
-            <a:off x="483489" y="1138927"/>
+            <a:off x="483489" y="1282701"/>
             <a:ext cx="8180682" cy="1692398"/>
           </a:xfrm>
           <a:prstGeom prst="rect">
@@ -24157,145 +24307,22 @@
                 <a:ea typeface="+mn-lt"/>
                 <a:cs typeface="+mn-lt"/>
               </a:rPr>
-              <a:t>En primer lugar, observamos que las tallas Premium e Ideal son las más comunes y tienden a tener una mayor concentración en ciertos rangos de peso, lo que sugiere que los diamantes con estas características pueden tener una demanda más alta. Sin embargo, también es importante tener en cuenta que la talla Justa muestra una mayor variabilidad en cuanto al peso, lo que podría ofrecer opciones más diversas para diferentes preferencias y presupuestos.</a:t>
+              <a:t>En primer lugar, observamos las frecuencias, en cuanto a la talla la clasificación Premium e Ideal son las más comunes, en cuanto al color, notamos que el color G es el más frecuente mientras que el color J es el menos frecuente, sobre la pureza cabe destacar el SI1 como el más frecuente y el VVS1 como el menos frecuente y finalmente respecto al precio, los valores promedios vienen entre los $326 a $18826, teniendo la mayor frecuencia de precios concentrada cerca de los $5000.</a:t>
             </a:r>
             <a:endParaRPr lang="es-ES" sz="1600">
               <a:solidFill>
                 <a:schemeClr val="bg1"/>
               </a:solidFill>
+              <a:latin typeface="Calibri"/>
               <a:cs typeface="Calibri"/>
             </a:endParaRPr>
-          </a:p>
-          <a:p>
-            <a:pPr algn="just">
-              <a:buNone/>
-            </a:pPr>
-            <a:r>
-              <a:rPr lang="es-ES" sz="1600">
-                <a:solidFill>
-                  <a:schemeClr val="bg1"/>
-                </a:solidFill>
-                <a:ea typeface="+mn-lt"/>
-                <a:cs typeface="+mn-lt"/>
-              </a:rPr>
-              <a:t>En cuanto al color, notamos que el color G es el más frecuente y se acerca más al precio promedio, mientras que el color J tiende a alcanzar valores más altos. Sin embargo, el color E parece tener un valor inicial más bajo, aunque sus datos atípicos pueden llevarlo a precios más altos, lo que indica una posible oportunidad para obtener un buen valor por parte del cliente.</a:t>
-            </a:r>
-            <a:endParaRPr lang="es-ES" sz="1600">
-              <a:solidFill>
-                <a:schemeClr val="bg1"/>
-              </a:solidFill>
-              <a:cs typeface="Calibri"/>
-            </a:endParaRPr>
-          </a:p>
-          <a:p>
-            <a:pPr algn="just">
-              <a:buNone/>
-            </a:pPr>
-            <a:r>
-              <a:rPr lang="es-ES" sz="1600">
-                <a:solidFill>
-                  <a:schemeClr val="bg1"/>
-                </a:solidFill>
-                <a:ea typeface="+mn-lt"/>
-                <a:cs typeface="+mn-lt"/>
-              </a:rPr>
-              <a:t>La pureza también juega un papel crucial en la determinación del precio, donde el IF tiende a tener valores más bajos, pero sus datos atípicos pueden llevarlo a precios significativamente más altos, incluso superando los $15,000 en algunos casos.</a:t>
-            </a:r>
-            <a:endParaRPr lang="es-ES" sz="1600">
-              <a:solidFill>
-                <a:schemeClr val="bg1"/>
-              </a:solidFill>
-              <a:cs typeface="Calibri"/>
-            </a:endParaRPr>
-          </a:p>
-          <a:p>
-            <a:pPr algn="just">
-              <a:buNone/>
-            </a:pPr>
-            <a:r>
-              <a:rPr lang="es-ES" sz="1600">
-                <a:solidFill>
-                  <a:schemeClr val="bg1"/>
-                </a:solidFill>
-                <a:ea typeface="+mn-lt"/>
-                <a:cs typeface="+mn-lt"/>
-              </a:rPr>
-              <a:t>En resumen, para lograr el precio ideal para un diamante, se recomienda considerar cuidadosamente la combinación de características que mejor se adapten a las preferencias y presupuesto del cliente. Es importante tener en cuenta no solo las características más comunes, como la talla y el color, sino también los posibles valores atípicos que podrían influir en el precio final. </a:t>
-            </a:r>
-          </a:p>
-          <a:p>
-            <a:pPr marL="0" indent="0" algn="just">
-              <a:buFont typeface="Arial" panose="020B0604020202020204" pitchFamily="34" charset="0"/>
-              <a:buNone/>
-            </a:pPr>
-            <a:endParaRPr lang="es-ES" sz="1800">
-              <a:solidFill>
-                <a:schemeClr val="bg1"/>
-              </a:solidFill>
-              <a:latin typeface="Arial Narrow"/>
-            </a:endParaRPr>
-          </a:p>
-          <a:p>
-            <a:pPr marL="0" indent="0" algn="just">
-              <a:buFont typeface="Arial" panose="020B0604020202020204" pitchFamily="34" charset="0"/>
-              <a:buNone/>
-            </a:pPr>
-            <a:endParaRPr lang="en-US" sz="1800">
-              <a:solidFill>
-                <a:schemeClr val="bg1"/>
-              </a:solidFill>
-              <a:latin typeface="Arial Narrow" panose="020B0606020202030204" pitchFamily="34" charset="0"/>
-            </a:endParaRPr>
-          </a:p>
-        </p:txBody>
-      </p:sp>
-      <p:sp>
-        <p:nvSpPr>
-          <p:cNvPr id="12" name="CuadroTexto 11">
-            <a:extLst>
-              <a:ext uri="{FF2B5EF4-FFF2-40B4-BE49-F238E27FC236}">
-                <a16:creationId xmlns:a16="http://schemas.microsoft.com/office/drawing/2014/main" id="{A3A365B2-B2DE-4D2C-92CE-32C0611969DB}"/>
-              </a:ext>
-            </a:extLst>
-          </p:cNvPr>
-          <p:cNvSpPr txBox="1"/>
-          <p:nvPr/>
-        </p:nvSpPr>
-        <p:spPr>
-          <a:xfrm>
-            <a:off x="3360366" y="457769"/>
-            <a:ext cx="2423849" cy="461665"/>
-          </a:xfrm>
-          <a:prstGeom prst="rect">
-            <a:avLst/>
-          </a:prstGeom>
-          <a:noFill/>
-        </p:spPr>
-        <p:txBody>
-          <a:bodyPr wrap="square" lIns="91440" tIns="45720" rIns="91440" bIns="45720" anchor="t">
-            <a:spAutoFit/>
-          </a:bodyPr>
-          <a:lstStyle/>
-          <a:p>
-            <a:pPr algn="ctr"/>
-            <a:r>
-              <a:rPr lang="es-ES" sz="2400" b="1">
-                <a:solidFill>
-                  <a:schemeClr val="bg1"/>
-                </a:solidFill>
-                <a:latin typeface="Arial"/>
-                <a:cs typeface="Arial"/>
-              </a:rPr>
-              <a:t>Conclusiones</a:t>
-            </a:r>
-            <a:endParaRPr lang="en-US" sz="2400"/>
           </a:p>
         </p:txBody>
       </p:sp>
     </p:spTree>
     <p:extLst>
       <p:ext uri="{BB962C8B-B14F-4D97-AF65-F5344CB8AC3E}">
-        <p14:creationId xmlns:p14="http://schemas.microsoft.com/office/powerpoint/2010/main" val="2948978149"/>
+        <p14:creationId xmlns:p14="http://schemas.microsoft.com/office/powerpoint/2010/main" val="2835389643"/>
       </p:ext>
     </p:extLst>
   </p:cSld>
@@ -26159,571 +26186,6 @@
       </p:sp>
       <p:pic>
         <p:nvPicPr>
-          <p:cNvPr id="2" name="Picture 1">
-            <a:extLst>
-              <a:ext uri="{FF2B5EF4-FFF2-40B4-BE49-F238E27FC236}">
-                <a16:creationId xmlns:a16="http://schemas.microsoft.com/office/drawing/2014/main" id="{23A4DE73-032F-5C86-32D4-47B88187D538}"/>
-              </a:ext>
-            </a:extLst>
-          </p:cNvPr>
-          <p:cNvPicPr>
-            <a:picLocks noChangeAspect="1"/>
-          </p:cNvPicPr>
-          <p:nvPr/>
-        </p:nvPicPr>
-        <p:blipFill>
-          <a:blip r:embed="rId3"/>
-          <a:stretch>
-            <a:fillRect/>
-          </a:stretch>
-        </p:blipFill>
-        <p:spPr>
-          <a:xfrm>
-            <a:off x="437701" y="3783222"/>
-            <a:ext cx="1511241" cy="2555217"/>
-          </a:xfrm>
-          <a:prstGeom prst="rect">
-            <a:avLst/>
-          </a:prstGeom>
-        </p:spPr>
-      </p:pic>
-      <p:pic>
-        <p:nvPicPr>
-          <p:cNvPr id="3" name="Picture 2" descr="A graph with orange bars&#10;&#10;Description automatically generated">
-            <a:extLst>
-              <a:ext uri="{FF2B5EF4-FFF2-40B4-BE49-F238E27FC236}">
-                <a16:creationId xmlns:a16="http://schemas.microsoft.com/office/drawing/2014/main" id="{640B9896-0E17-3368-F85A-5F53EC3992AC}"/>
-              </a:ext>
-            </a:extLst>
-          </p:cNvPr>
-          <p:cNvPicPr>
-            <a:picLocks noChangeAspect="1"/>
-          </p:cNvPicPr>
-          <p:nvPr/>
-        </p:nvPicPr>
-        <p:blipFill>
-          <a:blip r:embed="rId4"/>
-          <a:stretch>
-            <a:fillRect/>
-          </a:stretch>
-        </p:blipFill>
-        <p:spPr>
-          <a:xfrm>
-            <a:off x="2430043" y="3771452"/>
-            <a:ext cx="2141689" cy="2564382"/>
-          </a:xfrm>
-          <a:prstGeom prst="rect">
-            <a:avLst/>
-          </a:prstGeom>
-        </p:spPr>
-      </p:pic>
-      <p:pic>
-        <p:nvPicPr>
-          <p:cNvPr id="5" name="Picture 4" descr="A yellow rectangular object with white squares&#10;&#10;Description automatically generated">
-            <a:extLst>
-              <a:ext uri="{FF2B5EF4-FFF2-40B4-BE49-F238E27FC236}">
-                <a16:creationId xmlns:a16="http://schemas.microsoft.com/office/drawing/2014/main" id="{0929B4DC-0183-A67E-4063-7A9B6366CB8C}"/>
-              </a:ext>
-            </a:extLst>
-          </p:cNvPr>
-          <p:cNvPicPr>
-            <a:picLocks noChangeAspect="1"/>
-          </p:cNvPicPr>
-          <p:nvPr/>
-        </p:nvPicPr>
-        <p:blipFill>
-          <a:blip r:embed="rId5"/>
-          <a:stretch>
-            <a:fillRect/>
-          </a:stretch>
-        </p:blipFill>
-        <p:spPr>
-          <a:xfrm>
-            <a:off x="4934938" y="3717087"/>
-            <a:ext cx="524955" cy="2601224"/>
-          </a:xfrm>
-          <a:prstGeom prst="rect">
-            <a:avLst/>
-          </a:prstGeom>
-        </p:spPr>
-      </p:pic>
-      <p:pic>
-        <p:nvPicPr>
-          <p:cNvPr id="6" name="Picture 5" descr="A yellow rectangle with white border&#10;&#10;Description automatically generated">
-            <a:extLst>
-              <a:ext uri="{FF2B5EF4-FFF2-40B4-BE49-F238E27FC236}">
-                <a16:creationId xmlns:a16="http://schemas.microsoft.com/office/drawing/2014/main" id="{828B1B0B-830C-A59F-093E-ABC975932E43}"/>
-              </a:ext>
-            </a:extLst>
-          </p:cNvPr>
-          <p:cNvPicPr>
-            <a:picLocks noChangeAspect="1"/>
-          </p:cNvPicPr>
-          <p:nvPr/>
-        </p:nvPicPr>
-        <p:blipFill>
-          <a:blip r:embed="rId6"/>
-          <a:stretch>
-            <a:fillRect/>
-          </a:stretch>
-        </p:blipFill>
-        <p:spPr>
-          <a:xfrm>
-            <a:off x="5471214" y="5017968"/>
-            <a:ext cx="545082" cy="1322178"/>
-          </a:xfrm>
-          <a:prstGeom prst="rect">
-            <a:avLst/>
-          </a:prstGeom>
-        </p:spPr>
-      </p:pic>
-      <p:pic>
-        <p:nvPicPr>
-          <p:cNvPr id="7" name="Picture 6" descr="A red graph with numbers&#10;&#10;Description automatically generated">
-            <a:extLst>
-              <a:ext uri="{FF2B5EF4-FFF2-40B4-BE49-F238E27FC236}">
-                <a16:creationId xmlns:a16="http://schemas.microsoft.com/office/drawing/2014/main" id="{069A3D7C-E249-8072-81C8-C5317D249C66}"/>
-              </a:ext>
-            </a:extLst>
-          </p:cNvPr>
-          <p:cNvPicPr>
-            <a:picLocks noChangeAspect="1"/>
-          </p:cNvPicPr>
-          <p:nvPr/>
-        </p:nvPicPr>
-        <p:blipFill>
-          <a:blip r:embed="rId7"/>
-          <a:stretch>
-            <a:fillRect/>
-          </a:stretch>
-        </p:blipFill>
-        <p:spPr>
-          <a:xfrm>
-            <a:off x="6126821" y="3561901"/>
-            <a:ext cx="2598169" cy="2796577"/>
-          </a:xfrm>
-          <a:prstGeom prst="rect">
-            <a:avLst/>
-          </a:prstGeom>
-        </p:spPr>
-      </p:pic>
-      <p:sp>
-        <p:nvSpPr>
-          <p:cNvPr id="10" name="Marcador de contenido 2">
-            <a:extLst>
-              <a:ext uri="{FF2B5EF4-FFF2-40B4-BE49-F238E27FC236}">
-                <a16:creationId xmlns:a16="http://schemas.microsoft.com/office/drawing/2014/main" id="{022D82BC-67B0-4F5D-9A8F-C3B94B9A014B}"/>
-              </a:ext>
-            </a:extLst>
-          </p:cNvPr>
-          <p:cNvSpPr txBox="1">
-            <a:spLocks/>
-          </p:cNvSpPr>
-          <p:nvPr/>
-        </p:nvSpPr>
-        <p:spPr>
-          <a:xfrm>
-            <a:off x="483489" y="1282701"/>
-            <a:ext cx="8180682" cy="1692398"/>
-          </a:xfrm>
-          <a:prstGeom prst="rect">
-            <a:avLst/>
-          </a:prstGeom>
-        </p:spPr>
-        <p:txBody>
-          <a:bodyPr vert="horz" lIns="91440" tIns="45720" rIns="91440" bIns="45720" rtlCol="0" anchor="t">
-            <a:noAutofit/>
-          </a:bodyPr>
-          <a:lstStyle>
-            <a:lvl1pPr marL="228600" indent="-228600" algn="l" defTabSz="914400" rtl="0" eaLnBrk="1" latinLnBrk="0" hangingPunct="1">
-              <a:lnSpc>
-                <a:spcPct val="90000"/>
-              </a:lnSpc>
-              <a:spcBef>
-                <a:spcPts val="1000"/>
-              </a:spcBef>
-              <a:buFont typeface="Arial" panose="020B0604020202020204" pitchFamily="34" charset="0"/>
-              <a:buChar char="•"/>
-              <a:defRPr sz="2800" kern="1200">
-                <a:solidFill>
-                  <a:schemeClr val="tx1"/>
-                </a:solidFill>
-                <a:latin typeface="+mn-lt"/>
-                <a:ea typeface="+mn-ea"/>
-                <a:cs typeface="+mn-cs"/>
-              </a:defRPr>
-            </a:lvl1pPr>
-            <a:lvl2pPr marL="685800" indent="-228600" algn="l" defTabSz="914400" rtl="0" eaLnBrk="1" latinLnBrk="0" hangingPunct="1">
-              <a:lnSpc>
-                <a:spcPct val="90000"/>
-              </a:lnSpc>
-              <a:spcBef>
-                <a:spcPts val="500"/>
-              </a:spcBef>
-              <a:buFont typeface="Arial" panose="020B0604020202020204" pitchFamily="34" charset="0"/>
-              <a:buChar char="•"/>
-              <a:defRPr sz="2400" kern="1200">
-                <a:solidFill>
-                  <a:schemeClr val="tx1"/>
-                </a:solidFill>
-                <a:latin typeface="+mn-lt"/>
-                <a:ea typeface="+mn-ea"/>
-                <a:cs typeface="+mn-cs"/>
-              </a:defRPr>
-            </a:lvl2pPr>
-            <a:lvl3pPr marL="1143000" indent="-228600" algn="l" defTabSz="914400" rtl="0" eaLnBrk="1" latinLnBrk="0" hangingPunct="1">
-              <a:lnSpc>
-                <a:spcPct val="90000"/>
-              </a:lnSpc>
-              <a:spcBef>
-                <a:spcPts val="500"/>
-              </a:spcBef>
-              <a:buFont typeface="Arial" panose="020B0604020202020204" pitchFamily="34" charset="0"/>
-              <a:buChar char="•"/>
-              <a:defRPr sz="2000" kern="1200">
-                <a:solidFill>
-                  <a:schemeClr val="tx1"/>
-                </a:solidFill>
-                <a:latin typeface="+mn-lt"/>
-                <a:ea typeface="+mn-ea"/>
-                <a:cs typeface="+mn-cs"/>
-              </a:defRPr>
-            </a:lvl3pPr>
-            <a:lvl4pPr marL="1600200" indent="-228600" algn="l" defTabSz="914400" rtl="0" eaLnBrk="1" latinLnBrk="0" hangingPunct="1">
-              <a:lnSpc>
-                <a:spcPct val="90000"/>
-              </a:lnSpc>
-              <a:spcBef>
-                <a:spcPts val="500"/>
-              </a:spcBef>
-              <a:buFont typeface="Arial" panose="020B0604020202020204" pitchFamily="34" charset="0"/>
-              <a:buChar char="•"/>
-              <a:defRPr sz="1800" kern="1200">
-                <a:solidFill>
-                  <a:schemeClr val="tx1"/>
-                </a:solidFill>
-                <a:latin typeface="+mn-lt"/>
-                <a:ea typeface="+mn-ea"/>
-                <a:cs typeface="+mn-cs"/>
-              </a:defRPr>
-            </a:lvl4pPr>
-            <a:lvl5pPr marL="2057400" indent="-228600" algn="l" defTabSz="914400" rtl="0" eaLnBrk="1" latinLnBrk="0" hangingPunct="1">
-              <a:lnSpc>
-                <a:spcPct val="90000"/>
-              </a:lnSpc>
-              <a:spcBef>
-                <a:spcPts val="500"/>
-              </a:spcBef>
-              <a:buFont typeface="Arial" panose="020B0604020202020204" pitchFamily="34" charset="0"/>
-              <a:buChar char="•"/>
-              <a:defRPr sz="1800" kern="1200">
-                <a:solidFill>
-                  <a:schemeClr val="tx1"/>
-                </a:solidFill>
-                <a:latin typeface="+mn-lt"/>
-                <a:ea typeface="+mn-ea"/>
-                <a:cs typeface="+mn-cs"/>
-              </a:defRPr>
-            </a:lvl5pPr>
-            <a:lvl6pPr marL="2514600" indent="-228600" algn="l" defTabSz="914400" rtl="0" eaLnBrk="1" latinLnBrk="0" hangingPunct="1">
-              <a:lnSpc>
-                <a:spcPct val="90000"/>
-              </a:lnSpc>
-              <a:spcBef>
-                <a:spcPts val="500"/>
-              </a:spcBef>
-              <a:buFont typeface="Arial" panose="020B0604020202020204" pitchFamily="34" charset="0"/>
-              <a:buChar char="•"/>
-              <a:defRPr sz="1800" kern="1200">
-                <a:solidFill>
-                  <a:schemeClr val="tx1"/>
-                </a:solidFill>
-                <a:latin typeface="+mn-lt"/>
-                <a:ea typeface="+mn-ea"/>
-                <a:cs typeface="+mn-cs"/>
-              </a:defRPr>
-            </a:lvl6pPr>
-            <a:lvl7pPr marL="2971800" indent="-228600" algn="l" defTabSz="914400" rtl="0" eaLnBrk="1" latinLnBrk="0" hangingPunct="1">
-              <a:lnSpc>
-                <a:spcPct val="90000"/>
-              </a:lnSpc>
-              <a:spcBef>
-                <a:spcPts val="500"/>
-              </a:spcBef>
-              <a:buFont typeface="Arial" panose="020B0604020202020204" pitchFamily="34" charset="0"/>
-              <a:buChar char="•"/>
-              <a:defRPr sz="1800" kern="1200">
-                <a:solidFill>
-                  <a:schemeClr val="tx1"/>
-                </a:solidFill>
-                <a:latin typeface="+mn-lt"/>
-                <a:ea typeface="+mn-ea"/>
-                <a:cs typeface="+mn-cs"/>
-              </a:defRPr>
-            </a:lvl7pPr>
-            <a:lvl8pPr marL="3429000" indent="-228600" algn="l" defTabSz="914400" rtl="0" eaLnBrk="1" latinLnBrk="0" hangingPunct="1">
-              <a:lnSpc>
-                <a:spcPct val="90000"/>
-              </a:lnSpc>
-              <a:spcBef>
-                <a:spcPts val="500"/>
-              </a:spcBef>
-              <a:buFont typeface="Arial" panose="020B0604020202020204" pitchFamily="34" charset="0"/>
-              <a:buChar char="•"/>
-              <a:defRPr sz="1800" kern="1200">
-                <a:solidFill>
-                  <a:schemeClr val="tx1"/>
-                </a:solidFill>
-                <a:latin typeface="+mn-lt"/>
-                <a:ea typeface="+mn-ea"/>
-                <a:cs typeface="+mn-cs"/>
-              </a:defRPr>
-            </a:lvl8pPr>
-            <a:lvl9pPr marL="3886200" indent="-228600" algn="l" defTabSz="914400" rtl="0" eaLnBrk="1" latinLnBrk="0" hangingPunct="1">
-              <a:lnSpc>
-                <a:spcPct val="90000"/>
-              </a:lnSpc>
-              <a:spcBef>
-                <a:spcPts val="500"/>
-              </a:spcBef>
-              <a:buFont typeface="Arial" panose="020B0604020202020204" pitchFamily="34" charset="0"/>
-              <a:buChar char="•"/>
-              <a:defRPr sz="1800" kern="1200">
-                <a:solidFill>
-                  <a:schemeClr val="tx1"/>
-                </a:solidFill>
-                <a:latin typeface="+mn-lt"/>
-                <a:ea typeface="+mn-ea"/>
-                <a:cs typeface="+mn-cs"/>
-              </a:defRPr>
-            </a:lvl9pPr>
-          </a:lstStyle>
-          <a:p>
-            <a:pPr algn="just">
-              <a:buNone/>
-            </a:pPr>
-            <a:r>
-              <a:rPr lang="es-ES" sz="1600">
-                <a:solidFill>
-                  <a:schemeClr val="bg1"/>
-                </a:solidFill>
-                <a:ea typeface="+mn-lt"/>
-                <a:cs typeface="+mn-lt"/>
-              </a:rPr>
-              <a:t>Después de un análisis exhaustivo de los datos de los diamantes, hemos identificado patrones y relaciones clave que pueden influir en el precio de manera significativa. </a:t>
-            </a:r>
-            <a:endParaRPr lang="en-US">
-              <a:cs typeface="Calibri" panose="020F0502020204030204"/>
-            </a:endParaRPr>
-          </a:p>
-          <a:p>
-            <a:pPr algn="just">
-              <a:buNone/>
-            </a:pPr>
-            <a:r>
-              <a:rPr lang="es-ES" sz="1600">
-                <a:solidFill>
-                  <a:schemeClr val="bg1"/>
-                </a:solidFill>
-                <a:ea typeface="+mn-lt"/>
-                <a:cs typeface="+mn-lt"/>
-              </a:rPr>
-              <a:t>En primer lugar, observamos las frecuencias, en cuanto a la talla la clasificación Premium e Ideal son las más comunes, en cuanto al color, notamos que el color G es el más frecuente mientras que el color J es el menos frecuente, sobre la pureza cabe destacar el SI1 como el más frecuente y el VVS1 como el menos frecuente y finalmente respecto al precio, los valores promedios vienen entre los $326 a $18826, teniendo la mayor frecuencia de precios concentrada cerca de los $5000.</a:t>
-            </a:r>
-            <a:endParaRPr lang="es-ES" sz="1600">
-              <a:solidFill>
-                <a:schemeClr val="bg1"/>
-              </a:solidFill>
-              <a:latin typeface="Calibri"/>
-              <a:cs typeface="Calibri"/>
-            </a:endParaRPr>
-          </a:p>
-        </p:txBody>
-      </p:sp>
-    </p:spTree>
-    <p:extLst>
-      <p:ext uri="{BB962C8B-B14F-4D97-AF65-F5344CB8AC3E}">
-        <p14:creationId xmlns:p14="http://schemas.microsoft.com/office/powerpoint/2010/main" val="2835389643"/>
-      </p:ext>
-    </p:extLst>
-  </p:cSld>
-  <p:clrMapOvr>
-    <a:masterClrMapping/>
-  </p:clrMapOvr>
-</p:sld>
-</file>
-
-<file path=ppt/slides/slide21.xml><?xml version="1.0" encoding="utf-8"?>
-<p:sld xmlns:a="http://schemas.openxmlformats.org/drawingml/2006/main" xmlns:r="http://schemas.openxmlformats.org/officeDocument/2006/relationships" xmlns:p="http://schemas.openxmlformats.org/presentationml/2006/main">
-  <p:cSld>
-    <p:bg>
-      <p:bgPr>
-        <a:solidFill>
-          <a:schemeClr val="bg1"/>
-        </a:solidFill>
-        <a:effectLst/>
-      </p:bgPr>
-    </p:bg>
-    <p:spTree>
-      <p:nvGrpSpPr>
-        <p:cNvPr id="1" name=""/>
-        <p:cNvGrpSpPr/>
-        <p:nvPr/>
-      </p:nvGrpSpPr>
-      <p:grpSpPr>
-        <a:xfrm>
-          <a:off x="0" y="0"/>
-          <a:ext cx="0" cy="0"/>
-          <a:chOff x="0" y="0"/>
-          <a:chExt cx="0" cy="0"/>
-        </a:xfrm>
-      </p:grpSpPr>
-      <p:sp>
-        <p:nvSpPr>
-          <p:cNvPr id="23" name="Rectángulo 22">
-            <a:extLst>
-              <a:ext uri="{FF2B5EF4-FFF2-40B4-BE49-F238E27FC236}">
-                <a16:creationId xmlns:a16="http://schemas.microsoft.com/office/drawing/2014/main" id="{73182A38-D6DF-453D-921E-315EFA20E2ED}"/>
-              </a:ext>
-            </a:extLst>
-          </p:cNvPr>
-          <p:cNvSpPr/>
-          <p:nvPr/>
-        </p:nvSpPr>
-        <p:spPr>
-          <a:xfrm>
-            <a:off x="0" y="-1786"/>
-            <a:ext cx="9149206" cy="6858000"/>
-          </a:xfrm>
-          <a:prstGeom prst="rect">
-            <a:avLst/>
-          </a:prstGeom>
-          <a:solidFill>
-            <a:srgbClr val="C1292E"/>
-          </a:solidFill>
-          <a:ln w="0">
-            <a:noFill/>
-          </a:ln>
-        </p:spPr>
-        <p:style>
-          <a:lnRef idx="2">
-            <a:schemeClr val="accent1">
-              <a:shade val="50000"/>
-            </a:schemeClr>
-          </a:lnRef>
-          <a:fillRef idx="1">
-            <a:schemeClr val="accent1"/>
-          </a:fillRef>
-          <a:effectRef idx="0">
-            <a:schemeClr val="accent1"/>
-          </a:effectRef>
-          <a:fontRef idx="minor">
-            <a:schemeClr val="lt1"/>
-          </a:fontRef>
-        </p:style>
-        <p:txBody>
-          <a:bodyPr rtlCol="0" anchor="ctr"/>
-          <a:lstStyle/>
-          <a:p>
-            <a:pPr algn="ctr"/>
-            <a:endParaRPr lang="es-CL"/>
-          </a:p>
-        </p:txBody>
-      </p:sp>
-      <p:sp>
-        <p:nvSpPr>
-          <p:cNvPr id="4" name="Rectangle: Rounded Corners 3">
-            <a:extLst>
-              <a:ext uri="{FF2B5EF4-FFF2-40B4-BE49-F238E27FC236}">
-                <a16:creationId xmlns:a16="http://schemas.microsoft.com/office/drawing/2014/main" id="{8C95EEAD-54C8-6263-AF14-7814E601259B}"/>
-              </a:ext>
-            </a:extLst>
-          </p:cNvPr>
-          <p:cNvSpPr/>
-          <p:nvPr/>
-        </p:nvSpPr>
-        <p:spPr>
-          <a:xfrm>
-            <a:off x="3028680" y="357188"/>
-            <a:ext cx="3091132" cy="589471"/>
-          </a:xfrm>
-          <a:prstGeom prst="roundRect">
-            <a:avLst/>
-          </a:prstGeom>
-          <a:solidFill>
-            <a:srgbClr val="2E2E2E"/>
-          </a:solidFill>
-        </p:spPr>
-        <p:style>
-          <a:lnRef idx="2">
-            <a:schemeClr val="accent1">
-              <a:shade val="15000"/>
-            </a:schemeClr>
-          </a:lnRef>
-          <a:fillRef idx="1">
-            <a:schemeClr val="accent1"/>
-          </a:fillRef>
-          <a:effectRef idx="0">
-            <a:schemeClr val="accent1"/>
-          </a:effectRef>
-          <a:fontRef idx="minor">
-            <a:schemeClr val="lt1"/>
-          </a:fontRef>
-        </p:style>
-        <p:txBody>
-          <a:bodyPr rtlCol="0" anchor="ctr"/>
-          <a:lstStyle/>
-          <a:p>
-            <a:pPr algn="ctr"/>
-            <a:endParaRPr lang="en-US"/>
-          </a:p>
-        </p:txBody>
-      </p:sp>
-      <p:sp>
-        <p:nvSpPr>
-          <p:cNvPr id="12" name="CuadroTexto 11">
-            <a:extLst>
-              <a:ext uri="{FF2B5EF4-FFF2-40B4-BE49-F238E27FC236}">
-                <a16:creationId xmlns:a16="http://schemas.microsoft.com/office/drawing/2014/main" id="{A3A365B2-B2DE-4D2C-92CE-32C0611969DB}"/>
-              </a:ext>
-            </a:extLst>
-          </p:cNvPr>
-          <p:cNvSpPr txBox="1"/>
-          <p:nvPr/>
-        </p:nvSpPr>
-        <p:spPr>
-          <a:xfrm>
-            <a:off x="3360366" y="457769"/>
-            <a:ext cx="2423849" cy="461665"/>
-          </a:xfrm>
-          <a:prstGeom prst="rect">
-            <a:avLst/>
-          </a:prstGeom>
-          <a:noFill/>
-        </p:spPr>
-        <p:txBody>
-          <a:bodyPr wrap="square" lIns="91440" tIns="45720" rIns="91440" bIns="45720" anchor="t">
-            <a:spAutoFit/>
-          </a:bodyPr>
-          <a:lstStyle/>
-          <a:p>
-            <a:pPr algn="ctr"/>
-            <a:r>
-              <a:rPr lang="es-ES" sz="2400" b="1">
-                <a:solidFill>
-                  <a:schemeClr val="bg1"/>
-                </a:solidFill>
-                <a:latin typeface="Arial"/>
-                <a:cs typeface="Arial"/>
-              </a:rPr>
-              <a:t>Conclusiones</a:t>
-            </a:r>
-            <a:endParaRPr lang="en-US" sz="2400"/>
-          </a:p>
-        </p:txBody>
-      </p:sp>
-      <p:pic>
-        <p:nvPicPr>
           <p:cNvPr id="8" name="Picture 7" descr="A graph with green squares and black lines&#10;&#10;Description automatically generated">
             <a:extLst>
               <a:ext uri="{FF2B5EF4-FFF2-40B4-BE49-F238E27FC236}">
@@ -27127,7 +26589,7 @@
 </p:sld>
 </file>
 
-<file path=ppt/slides/slide22.xml><?xml version="1.0" encoding="utf-8"?>
+<file path=ppt/slides/slide21.xml><?xml version="1.0" encoding="utf-8"?>
 <p:sld xmlns:a="http://schemas.openxmlformats.org/drawingml/2006/main" xmlns:r="http://schemas.openxmlformats.org/officeDocument/2006/relationships" xmlns:p="http://schemas.openxmlformats.org/presentationml/2006/main">
   <p:cSld>
     <p:spTree>

</xml_diff>